<commit_message>
download benchmarks chart as pptx
</commit_message>
<xml_diff>
--- a/djaopsp/templates/app/reporting/doughnut.pptx
+++ b/djaopsp/templates/app/reporting/doughnut.pptx
@@ -12,11 +12,12 @@
 </p:presentation>
 </file>
 
-<file path=ppt/charts/chart1.xml><?xml version="1.0" encoding="utf-8"?>
+<file path=ppt/charts/chart4.xml><?xml version="1.0" encoding="utf-8"?>
 <c:chartSpace xmlns:c="http://schemas.openxmlformats.org/drawingml/2006/chart" xmlns:a="http://schemas.openxmlformats.org/drawingml/2006/main" xmlns:r="http://schemas.openxmlformats.org/officeDocument/2006/relationships">
   <c:lang val="en-US"/>
   <c:roundedCorners val="0"/>
   <c:chart>
+    <c:autoTitleDeleted val="1"/>
     <c:plotArea>
       <c:doughnutChart>
         <c:varyColors val="1"/>
@@ -38,7 +39,7 @@
             <a:solidFill>
               <a:srgbClr val="3fa95f"/>
             </a:solidFill>
-            <a:ln>
+            <a:ln w="0">
               <a:noFill/>
             </a:ln>
           </c:spPr>
@@ -49,7 +50,7 @@
               <a:solidFill>
                 <a:srgbClr val="3fa95f"/>
               </a:solidFill>
-              <a:ln>
+              <a:ln w="0">
                 <a:noFill/>
               </a:ln>
             </c:spPr>
@@ -60,18 +61,16 @@
               <a:solidFill>
                 <a:srgbClr val="3ca65b"/>
               </a:solidFill>
-              <a:ln>
+              <a:ln w="0">
                 <a:noFill/>
               </a:ln>
             </c:spPr>
           </c:dPt>
           <c:dLbls>
-            <c:numFmt formatCode="General" sourceLinked="1"/>
             <c:dLbl>
               <c:idx val="0"/>
-              <c:numFmt formatCode="General" sourceLinked="1"/>
               <c:txPr>
-                <a:bodyPr/>
+                <a:bodyPr wrap="square"/>
                 <a:lstStyle/>
                 <a:p>
                   <a:pPr>
@@ -94,9 +93,8 @@
             </c:dLbl>
             <c:dLbl>
               <c:idx val="1"/>
-              <c:numFmt formatCode="General" sourceLinked="1"/>
               <c:txPr>
-                <a:bodyPr/>
+                <a:bodyPr wrap="square"/>
                 <a:lstStyle/>
                 <a:p>
                   <a:pPr>
@@ -118,7 +116,7 @@
               <c:separator> </c:separator>
             </c:dLbl>
             <c:txPr>
-              <a:bodyPr/>
+              <a:bodyPr wrap="square"/>
               <a:lstStyle/>
               <a:p>
                 <a:pPr>
@@ -188,7 +186,7 @@
             <a:solidFill>
               <a:srgbClr val="facf6f"/>
             </a:solidFill>
-            <a:ln>
+            <a:ln w="0">
               <a:noFill/>
             </a:ln>
           </c:spPr>
@@ -199,7 +197,7 @@
               <a:solidFill>
                 <a:srgbClr val="facf6f"/>
               </a:solidFill>
-              <a:ln>
+              <a:ln w="0">
                 <a:noFill/>
               </a:ln>
             </c:spPr>
@@ -210,18 +208,16 @@
               <a:solidFill>
                 <a:srgbClr val="f0ad4e"/>
               </a:solidFill>
-              <a:ln>
+              <a:ln w="0">
                 <a:noFill/>
               </a:ln>
             </c:spPr>
           </c:dPt>
           <c:dLbls>
-            <c:numFmt formatCode="General" sourceLinked="1"/>
             <c:dLbl>
               <c:idx val="0"/>
-              <c:numFmt formatCode="General" sourceLinked="1"/>
               <c:txPr>
-                <a:bodyPr/>
+                <a:bodyPr wrap="square"/>
                 <a:lstStyle/>
                 <a:p>
                   <a:pPr>
@@ -244,9 +240,8 @@
             </c:dLbl>
             <c:dLbl>
               <c:idx val="1"/>
-              <c:numFmt formatCode="General" sourceLinked="1"/>
               <c:txPr>
-                <a:bodyPr/>
+                <a:bodyPr wrap="square"/>
                 <a:lstStyle/>
                 <a:p>
                   <a:pPr>
@@ -268,7 +263,7 @@
               <c:separator> </c:separator>
             </c:dLbl>
             <c:txPr>
-              <a:bodyPr/>
+              <a:bodyPr wrap="square"/>
               <a:lstStyle/>
               <a:p>
                 <a:pPr>
@@ -325,7 +320,7 @@
       </c:doughnutChart>
       <c:spPr>
         <a:noFill/>
-        <a:ln>
+        <a:ln w="0">
           <a:solidFill>
             <a:srgbClr val="b3b3b3"/>
           </a:solidFill>
@@ -337,7 +332,7 @@
       <c:overlay val="0"/>
       <c:spPr>
         <a:noFill/>
-        <a:ln>
+        <a:ln w="0">
           <a:noFill/>
         </a:ln>
       </c:spPr>
@@ -410,7 +405,7 @@
       </p:grpSpPr>
       <p:sp>
         <p:nvSpPr>
-          <p:cNvPr id="21" name="PlaceHolder 1"/>
+          <p:cNvPr id="23" name="PlaceHolder 1"/>
           <p:cNvSpPr>
             <a:spLocks noGrp="1"/>
           </p:cNvSpPr>
@@ -426,13 +421,19 @@
           <a:prstGeom prst="rect">
             <a:avLst/>
           </a:prstGeom>
+          <a:noFill/>
+          <a:ln w="0">
+            <a:noFill/>
+          </a:ln>
         </p:spPr>
         <p:txBody>
           <a:bodyPr lIns="0" rIns="0" tIns="0" bIns="0" anchor="ctr">
-            <a:spAutoFit/>
-          </a:bodyPr>
-          <a:p>
-            <a:pPr algn="ctr"/>
+            <a:noAutofit/>
+          </a:bodyPr>
+          <a:p>
+            <a:pPr algn="ctr">
+              <a:buNone/>
+            </a:pPr>
             <a:endParaRPr b="0" lang="en-US" sz="4400" spc="-1" strike="noStrike">
               <a:latin typeface="Arial"/>
             </a:endParaRPr>
@@ -441,12 +442,12 @@
       </p:sp>
       <p:sp>
         <p:nvSpPr>
-          <p:cNvPr id="22" name="PlaceHolder 2"/>
-          <p:cNvSpPr>
-            <a:spLocks noGrp="1"/>
-          </p:cNvSpPr>
-          <p:nvPr>
-            <p:ph type="body"/>
+          <p:cNvPr id="24" name="PlaceHolder 2"/>
+          <p:cNvSpPr>
+            <a:spLocks noGrp="1"/>
+          </p:cNvSpPr>
+          <p:nvPr>
+            <p:ph/>
           </p:nvPr>
         </p:nvSpPr>
         <p:spPr>
@@ -457,9 +458,13 @@
           <a:prstGeom prst="rect">
             <a:avLst/>
           </a:prstGeom>
-        </p:spPr>
-        <p:txBody>
-          <a:bodyPr lIns="0" rIns="0" tIns="0" bIns="0">
+          <a:noFill/>
+          <a:ln w="0">
+            <a:noFill/>
+          </a:ln>
+        </p:spPr>
+        <p:txBody>
+          <a:bodyPr lIns="0" rIns="0" tIns="0" bIns="0" anchor="t">
             <a:normAutofit/>
           </a:bodyPr>
           <a:p>
@@ -471,12 +476,12 @@
       </p:sp>
       <p:sp>
         <p:nvSpPr>
-          <p:cNvPr id="23" name="PlaceHolder 3"/>
-          <p:cNvSpPr>
-            <a:spLocks noGrp="1"/>
-          </p:cNvSpPr>
-          <p:nvPr>
-            <p:ph type="body"/>
+          <p:cNvPr id="25" name="PlaceHolder 3"/>
+          <p:cNvSpPr>
+            <a:spLocks noGrp="1"/>
+          </p:cNvSpPr>
+          <p:nvPr>
+            <p:ph/>
           </p:nvPr>
         </p:nvSpPr>
         <p:spPr>
@@ -487,9 +492,13 @@
           <a:prstGeom prst="rect">
             <a:avLst/>
           </a:prstGeom>
-        </p:spPr>
-        <p:txBody>
-          <a:bodyPr lIns="0" rIns="0" tIns="0" bIns="0">
+          <a:noFill/>
+          <a:ln w="0">
+            <a:noFill/>
+          </a:ln>
+        </p:spPr>
+        <p:txBody>
+          <a:bodyPr lIns="0" rIns="0" tIns="0" bIns="0" anchor="t">
             <a:normAutofit/>
           </a:bodyPr>
           <a:p>
@@ -523,7 +532,7 @@
       </p:grpSpPr>
       <p:sp>
         <p:nvSpPr>
-          <p:cNvPr id="24" name="PlaceHolder 1"/>
+          <p:cNvPr id="26" name="PlaceHolder 1"/>
           <p:cNvSpPr>
             <a:spLocks noGrp="1"/>
           </p:cNvSpPr>
@@ -539,13 +548,19 @@
           <a:prstGeom prst="rect">
             <a:avLst/>
           </a:prstGeom>
+          <a:noFill/>
+          <a:ln w="0">
+            <a:noFill/>
+          </a:ln>
         </p:spPr>
         <p:txBody>
           <a:bodyPr lIns="0" rIns="0" tIns="0" bIns="0" anchor="ctr">
-            <a:spAutoFit/>
-          </a:bodyPr>
-          <a:p>
-            <a:pPr algn="ctr"/>
+            <a:noAutofit/>
+          </a:bodyPr>
+          <a:p>
+            <a:pPr algn="ctr">
+              <a:buNone/>
+            </a:pPr>
             <a:endParaRPr b="0" lang="en-US" sz="4400" spc="-1" strike="noStrike">
               <a:latin typeface="Arial"/>
             </a:endParaRPr>
@@ -554,12 +569,12 @@
       </p:sp>
       <p:sp>
         <p:nvSpPr>
-          <p:cNvPr id="25" name="PlaceHolder 2"/>
-          <p:cNvSpPr>
-            <a:spLocks noGrp="1"/>
-          </p:cNvSpPr>
-          <p:nvPr>
-            <p:ph type="body"/>
+          <p:cNvPr id="27" name="PlaceHolder 2"/>
+          <p:cNvSpPr>
+            <a:spLocks noGrp="1"/>
+          </p:cNvSpPr>
+          <p:nvPr>
+            <p:ph/>
           </p:nvPr>
         </p:nvSpPr>
         <p:spPr>
@@ -570,9 +585,13 @@
           <a:prstGeom prst="rect">
             <a:avLst/>
           </a:prstGeom>
-        </p:spPr>
-        <p:txBody>
-          <a:bodyPr lIns="0" rIns="0" tIns="0" bIns="0">
+          <a:noFill/>
+          <a:ln w="0">
+            <a:noFill/>
+          </a:ln>
+        </p:spPr>
+        <p:txBody>
+          <a:bodyPr lIns="0" rIns="0" tIns="0" bIns="0" anchor="t">
             <a:normAutofit/>
           </a:bodyPr>
           <a:p>
@@ -584,12 +603,12 @@
       </p:sp>
       <p:sp>
         <p:nvSpPr>
-          <p:cNvPr id="26" name="PlaceHolder 3"/>
-          <p:cNvSpPr>
-            <a:spLocks noGrp="1"/>
-          </p:cNvSpPr>
-          <p:nvPr>
-            <p:ph type="body"/>
+          <p:cNvPr id="28" name="PlaceHolder 3"/>
+          <p:cNvSpPr>
+            <a:spLocks noGrp="1"/>
+          </p:cNvSpPr>
+          <p:nvPr>
+            <p:ph/>
           </p:nvPr>
         </p:nvSpPr>
         <p:spPr>
@@ -600,9 +619,13 @@
           <a:prstGeom prst="rect">
             <a:avLst/>
           </a:prstGeom>
-        </p:spPr>
-        <p:txBody>
-          <a:bodyPr lIns="0" rIns="0" tIns="0" bIns="0">
+          <a:noFill/>
+          <a:ln w="0">
+            <a:noFill/>
+          </a:ln>
+        </p:spPr>
+        <p:txBody>
+          <a:bodyPr lIns="0" rIns="0" tIns="0" bIns="0" anchor="t">
             <a:normAutofit/>
           </a:bodyPr>
           <a:p>
@@ -614,12 +637,12 @@
       </p:sp>
       <p:sp>
         <p:nvSpPr>
-          <p:cNvPr id="27" name="PlaceHolder 4"/>
-          <p:cNvSpPr>
-            <a:spLocks noGrp="1"/>
-          </p:cNvSpPr>
-          <p:nvPr>
-            <p:ph type="body"/>
+          <p:cNvPr id="29" name="PlaceHolder 4"/>
+          <p:cNvSpPr>
+            <a:spLocks noGrp="1"/>
+          </p:cNvSpPr>
+          <p:nvPr>
+            <p:ph/>
           </p:nvPr>
         </p:nvSpPr>
         <p:spPr>
@@ -630,9 +653,13 @@
           <a:prstGeom prst="rect">
             <a:avLst/>
           </a:prstGeom>
-        </p:spPr>
-        <p:txBody>
-          <a:bodyPr lIns="0" rIns="0" tIns="0" bIns="0">
+          <a:noFill/>
+          <a:ln w="0">
+            <a:noFill/>
+          </a:ln>
+        </p:spPr>
+        <p:txBody>
+          <a:bodyPr lIns="0" rIns="0" tIns="0" bIns="0" anchor="t">
             <a:normAutofit/>
           </a:bodyPr>
           <a:p>
@@ -644,12 +671,12 @@
       </p:sp>
       <p:sp>
         <p:nvSpPr>
-          <p:cNvPr id="28" name="PlaceHolder 5"/>
-          <p:cNvSpPr>
-            <a:spLocks noGrp="1"/>
-          </p:cNvSpPr>
-          <p:nvPr>
-            <p:ph type="body"/>
+          <p:cNvPr id="30" name="PlaceHolder 5"/>
+          <p:cNvSpPr>
+            <a:spLocks noGrp="1"/>
+          </p:cNvSpPr>
+          <p:nvPr>
+            <p:ph/>
           </p:nvPr>
         </p:nvSpPr>
         <p:spPr>
@@ -660,9 +687,13 @@
           <a:prstGeom prst="rect">
             <a:avLst/>
           </a:prstGeom>
-        </p:spPr>
-        <p:txBody>
-          <a:bodyPr lIns="0" rIns="0" tIns="0" bIns="0">
+          <a:noFill/>
+          <a:ln w="0">
+            <a:noFill/>
+          </a:ln>
+        </p:spPr>
+        <p:txBody>
+          <a:bodyPr lIns="0" rIns="0" tIns="0" bIns="0" anchor="t">
             <a:normAutofit/>
           </a:bodyPr>
           <a:p>
@@ -696,7 +727,7 @@
       </p:grpSpPr>
       <p:sp>
         <p:nvSpPr>
-          <p:cNvPr id="29" name="PlaceHolder 1"/>
+          <p:cNvPr id="31" name="PlaceHolder 1"/>
           <p:cNvSpPr>
             <a:spLocks noGrp="1"/>
           </p:cNvSpPr>
@@ -712,13 +743,19 @@
           <a:prstGeom prst="rect">
             <a:avLst/>
           </a:prstGeom>
+          <a:noFill/>
+          <a:ln w="0">
+            <a:noFill/>
+          </a:ln>
         </p:spPr>
         <p:txBody>
           <a:bodyPr lIns="0" rIns="0" tIns="0" bIns="0" anchor="ctr">
-            <a:spAutoFit/>
-          </a:bodyPr>
-          <a:p>
-            <a:pPr algn="ctr"/>
+            <a:noAutofit/>
+          </a:bodyPr>
+          <a:p>
+            <a:pPr algn="ctr">
+              <a:buNone/>
+            </a:pPr>
             <a:endParaRPr b="0" lang="en-US" sz="4400" spc="-1" strike="noStrike">
               <a:latin typeface="Arial"/>
             </a:endParaRPr>
@@ -727,12 +764,12 @@
       </p:sp>
       <p:sp>
         <p:nvSpPr>
-          <p:cNvPr id="30" name="PlaceHolder 2"/>
-          <p:cNvSpPr>
-            <a:spLocks noGrp="1"/>
-          </p:cNvSpPr>
-          <p:nvPr>
-            <p:ph type="body"/>
+          <p:cNvPr id="32" name="PlaceHolder 2"/>
+          <p:cNvSpPr>
+            <a:spLocks noGrp="1"/>
+          </p:cNvSpPr>
+          <p:nvPr>
+            <p:ph/>
           </p:nvPr>
         </p:nvSpPr>
         <p:spPr>
@@ -743,9 +780,13 @@
           <a:prstGeom prst="rect">
             <a:avLst/>
           </a:prstGeom>
-        </p:spPr>
-        <p:txBody>
-          <a:bodyPr lIns="0" rIns="0" tIns="0" bIns="0">
+          <a:noFill/>
+          <a:ln w="0">
+            <a:noFill/>
+          </a:ln>
+        </p:spPr>
+        <p:txBody>
+          <a:bodyPr lIns="0" rIns="0" tIns="0" bIns="0" anchor="t">
             <a:normAutofit/>
           </a:bodyPr>
           <a:p>
@@ -757,12 +798,12 @@
       </p:sp>
       <p:sp>
         <p:nvSpPr>
-          <p:cNvPr id="31" name="PlaceHolder 3"/>
-          <p:cNvSpPr>
-            <a:spLocks noGrp="1"/>
-          </p:cNvSpPr>
-          <p:nvPr>
-            <p:ph type="body"/>
+          <p:cNvPr id="33" name="PlaceHolder 3"/>
+          <p:cNvSpPr>
+            <a:spLocks noGrp="1"/>
+          </p:cNvSpPr>
+          <p:nvPr>
+            <p:ph/>
           </p:nvPr>
         </p:nvSpPr>
         <p:spPr>
@@ -773,9 +814,13 @@
           <a:prstGeom prst="rect">
             <a:avLst/>
           </a:prstGeom>
-        </p:spPr>
-        <p:txBody>
-          <a:bodyPr lIns="0" rIns="0" tIns="0" bIns="0">
+          <a:noFill/>
+          <a:ln w="0">
+            <a:noFill/>
+          </a:ln>
+        </p:spPr>
+        <p:txBody>
+          <a:bodyPr lIns="0" rIns="0" tIns="0" bIns="0" anchor="t">
             <a:normAutofit/>
           </a:bodyPr>
           <a:p>
@@ -787,12 +832,12 @@
       </p:sp>
       <p:sp>
         <p:nvSpPr>
-          <p:cNvPr id="32" name="PlaceHolder 4"/>
-          <p:cNvSpPr>
-            <a:spLocks noGrp="1"/>
-          </p:cNvSpPr>
-          <p:nvPr>
-            <p:ph type="body"/>
+          <p:cNvPr id="34" name="PlaceHolder 4"/>
+          <p:cNvSpPr>
+            <a:spLocks noGrp="1"/>
+          </p:cNvSpPr>
+          <p:nvPr>
+            <p:ph/>
           </p:nvPr>
         </p:nvSpPr>
         <p:spPr>
@@ -803,9 +848,13 @@
           <a:prstGeom prst="rect">
             <a:avLst/>
           </a:prstGeom>
-        </p:spPr>
-        <p:txBody>
-          <a:bodyPr lIns="0" rIns="0" tIns="0" bIns="0">
+          <a:noFill/>
+          <a:ln w="0">
+            <a:noFill/>
+          </a:ln>
+        </p:spPr>
+        <p:txBody>
+          <a:bodyPr lIns="0" rIns="0" tIns="0" bIns="0" anchor="t">
             <a:normAutofit/>
           </a:bodyPr>
           <a:p>
@@ -817,12 +866,12 @@
       </p:sp>
       <p:sp>
         <p:nvSpPr>
-          <p:cNvPr id="33" name="PlaceHolder 5"/>
-          <p:cNvSpPr>
-            <a:spLocks noGrp="1"/>
-          </p:cNvSpPr>
-          <p:nvPr>
-            <p:ph type="body"/>
+          <p:cNvPr id="35" name="PlaceHolder 5"/>
+          <p:cNvSpPr>
+            <a:spLocks noGrp="1"/>
+          </p:cNvSpPr>
+          <p:nvPr>
+            <p:ph/>
           </p:nvPr>
         </p:nvSpPr>
         <p:spPr>
@@ -833,9 +882,13 @@
           <a:prstGeom prst="rect">
             <a:avLst/>
           </a:prstGeom>
-        </p:spPr>
-        <p:txBody>
-          <a:bodyPr lIns="0" rIns="0" tIns="0" bIns="0">
+          <a:noFill/>
+          <a:ln w="0">
+            <a:noFill/>
+          </a:ln>
+        </p:spPr>
+        <p:txBody>
+          <a:bodyPr lIns="0" rIns="0" tIns="0" bIns="0" anchor="t">
             <a:normAutofit/>
           </a:bodyPr>
           <a:p>
@@ -847,12 +900,12 @@
       </p:sp>
       <p:sp>
         <p:nvSpPr>
-          <p:cNvPr id="34" name="PlaceHolder 6"/>
-          <p:cNvSpPr>
-            <a:spLocks noGrp="1"/>
-          </p:cNvSpPr>
-          <p:nvPr>
-            <p:ph type="body"/>
+          <p:cNvPr id="36" name="PlaceHolder 6"/>
+          <p:cNvSpPr>
+            <a:spLocks noGrp="1"/>
+          </p:cNvSpPr>
+          <p:nvPr>
+            <p:ph/>
           </p:nvPr>
         </p:nvSpPr>
         <p:spPr>
@@ -863,9 +916,13 @@
           <a:prstGeom prst="rect">
             <a:avLst/>
           </a:prstGeom>
-        </p:spPr>
-        <p:txBody>
-          <a:bodyPr lIns="0" rIns="0" tIns="0" bIns="0">
+          <a:noFill/>
+          <a:ln w="0">
+            <a:noFill/>
+          </a:ln>
+        </p:spPr>
+        <p:txBody>
+          <a:bodyPr lIns="0" rIns="0" tIns="0" bIns="0" anchor="t">
             <a:normAutofit/>
           </a:bodyPr>
           <a:p>
@@ -877,12 +934,12 @@
       </p:sp>
       <p:sp>
         <p:nvSpPr>
-          <p:cNvPr id="35" name="PlaceHolder 7"/>
-          <p:cNvSpPr>
-            <a:spLocks noGrp="1"/>
-          </p:cNvSpPr>
-          <p:nvPr>
-            <p:ph type="body"/>
+          <p:cNvPr id="37" name="PlaceHolder 7"/>
+          <p:cNvSpPr>
+            <a:spLocks noGrp="1"/>
+          </p:cNvSpPr>
+          <p:nvPr>
+            <p:ph/>
           </p:nvPr>
         </p:nvSpPr>
         <p:spPr>
@@ -893,9 +950,13 @@
           <a:prstGeom prst="rect">
             <a:avLst/>
           </a:prstGeom>
-        </p:spPr>
-        <p:txBody>
-          <a:bodyPr lIns="0" rIns="0" tIns="0" bIns="0">
+          <a:noFill/>
+          <a:ln w="0">
+            <a:noFill/>
+          </a:ln>
+        </p:spPr>
+        <p:txBody>
+          <a:bodyPr lIns="0" rIns="0" tIns="0" bIns="0" anchor="t">
             <a:normAutofit/>
           </a:bodyPr>
           <a:p>
@@ -929,7 +990,7 @@
       </p:grpSpPr>
       <p:sp>
         <p:nvSpPr>
-          <p:cNvPr id="0" name="PlaceHolder 1"/>
+          <p:cNvPr id="2" name="PlaceHolder 1"/>
           <p:cNvSpPr>
             <a:spLocks noGrp="1"/>
           </p:cNvSpPr>
@@ -945,13 +1006,19 @@
           <a:prstGeom prst="rect">
             <a:avLst/>
           </a:prstGeom>
+          <a:noFill/>
+          <a:ln w="0">
+            <a:noFill/>
+          </a:ln>
         </p:spPr>
         <p:txBody>
           <a:bodyPr lIns="0" rIns="0" tIns="0" bIns="0" anchor="ctr">
-            <a:spAutoFit/>
-          </a:bodyPr>
-          <a:p>
-            <a:pPr algn="ctr"/>
+            <a:noAutofit/>
+          </a:bodyPr>
+          <a:p>
+            <a:pPr algn="ctr">
+              <a:buNone/>
+            </a:pPr>
             <a:endParaRPr b="0" lang="en-US" sz="4400" spc="-1" strike="noStrike">
               <a:latin typeface="Arial"/>
             </a:endParaRPr>
@@ -960,7 +1027,7 @@
       </p:sp>
       <p:sp>
         <p:nvSpPr>
-          <p:cNvPr id="1" name="PlaceHolder 2"/>
+          <p:cNvPr id="3" name="PlaceHolder 2"/>
           <p:cNvSpPr>
             <a:spLocks noGrp="1"/>
           </p:cNvSpPr>
@@ -976,13 +1043,19 @@
           <a:prstGeom prst="rect">
             <a:avLst/>
           </a:prstGeom>
+          <a:noFill/>
+          <a:ln w="0">
+            <a:noFill/>
+          </a:ln>
         </p:spPr>
         <p:txBody>
           <a:bodyPr lIns="0" rIns="0" tIns="0" bIns="0" anchor="ctr">
-            <a:spAutoFit/>
-          </a:bodyPr>
-          <a:p>
-            <a:pPr algn="ctr"/>
+            <a:noAutofit/>
+          </a:bodyPr>
+          <a:p>
+            <a:pPr algn="ctr">
+              <a:buNone/>
+            </a:pPr>
             <a:endParaRPr b="0" lang="en-US" sz="3200" spc="-1" strike="noStrike">
               <a:latin typeface="Arial"/>
             </a:endParaRPr>
@@ -1013,7 +1086,7 @@
       </p:grpSpPr>
       <p:sp>
         <p:nvSpPr>
-          <p:cNvPr id="2" name="PlaceHolder 1"/>
+          <p:cNvPr id="4" name="PlaceHolder 1"/>
           <p:cNvSpPr>
             <a:spLocks noGrp="1"/>
           </p:cNvSpPr>
@@ -1029,13 +1102,19 @@
           <a:prstGeom prst="rect">
             <a:avLst/>
           </a:prstGeom>
+          <a:noFill/>
+          <a:ln w="0">
+            <a:noFill/>
+          </a:ln>
         </p:spPr>
         <p:txBody>
           <a:bodyPr lIns="0" rIns="0" tIns="0" bIns="0" anchor="ctr">
-            <a:spAutoFit/>
-          </a:bodyPr>
-          <a:p>
-            <a:pPr algn="ctr"/>
+            <a:noAutofit/>
+          </a:bodyPr>
+          <a:p>
+            <a:pPr algn="ctr">
+              <a:buNone/>
+            </a:pPr>
             <a:endParaRPr b="0" lang="en-US" sz="4400" spc="-1" strike="noStrike">
               <a:latin typeface="Arial"/>
             </a:endParaRPr>
@@ -1044,12 +1123,12 @@
       </p:sp>
       <p:sp>
         <p:nvSpPr>
-          <p:cNvPr id="3" name="PlaceHolder 2"/>
-          <p:cNvSpPr>
-            <a:spLocks noGrp="1"/>
-          </p:cNvSpPr>
-          <p:nvPr>
-            <p:ph type="body"/>
+          <p:cNvPr id="5" name="PlaceHolder 2"/>
+          <p:cNvSpPr>
+            <a:spLocks noGrp="1"/>
+          </p:cNvSpPr>
+          <p:nvPr>
+            <p:ph/>
           </p:nvPr>
         </p:nvSpPr>
         <p:spPr>
@@ -1060,9 +1139,13 @@
           <a:prstGeom prst="rect">
             <a:avLst/>
           </a:prstGeom>
-        </p:spPr>
-        <p:txBody>
-          <a:bodyPr lIns="0" rIns="0" tIns="0" bIns="0">
+          <a:noFill/>
+          <a:ln w="0">
+            <a:noFill/>
+          </a:ln>
+        </p:spPr>
+        <p:txBody>
+          <a:bodyPr lIns="0" rIns="0" tIns="0" bIns="0" anchor="t">
             <a:normAutofit/>
           </a:bodyPr>
           <a:p>
@@ -1096,7 +1179,7 @@
       </p:grpSpPr>
       <p:sp>
         <p:nvSpPr>
-          <p:cNvPr id="4" name="PlaceHolder 1"/>
+          <p:cNvPr id="6" name="PlaceHolder 1"/>
           <p:cNvSpPr>
             <a:spLocks noGrp="1"/>
           </p:cNvSpPr>
@@ -1112,13 +1195,19 @@
           <a:prstGeom prst="rect">
             <a:avLst/>
           </a:prstGeom>
+          <a:noFill/>
+          <a:ln w="0">
+            <a:noFill/>
+          </a:ln>
         </p:spPr>
         <p:txBody>
           <a:bodyPr lIns="0" rIns="0" tIns="0" bIns="0" anchor="ctr">
-            <a:spAutoFit/>
-          </a:bodyPr>
-          <a:p>
-            <a:pPr algn="ctr"/>
+            <a:noAutofit/>
+          </a:bodyPr>
+          <a:p>
+            <a:pPr algn="ctr">
+              <a:buNone/>
+            </a:pPr>
             <a:endParaRPr b="0" lang="en-US" sz="4400" spc="-1" strike="noStrike">
               <a:latin typeface="Arial"/>
             </a:endParaRPr>
@@ -1127,12 +1216,12 @@
       </p:sp>
       <p:sp>
         <p:nvSpPr>
-          <p:cNvPr id="5" name="PlaceHolder 2"/>
-          <p:cNvSpPr>
-            <a:spLocks noGrp="1"/>
-          </p:cNvSpPr>
-          <p:nvPr>
-            <p:ph type="body"/>
+          <p:cNvPr id="7" name="PlaceHolder 2"/>
+          <p:cNvSpPr>
+            <a:spLocks noGrp="1"/>
+          </p:cNvSpPr>
+          <p:nvPr>
+            <p:ph/>
           </p:nvPr>
         </p:nvSpPr>
         <p:spPr>
@@ -1143,9 +1232,13 @@
           <a:prstGeom prst="rect">
             <a:avLst/>
           </a:prstGeom>
-        </p:spPr>
-        <p:txBody>
-          <a:bodyPr lIns="0" rIns="0" tIns="0" bIns="0">
+          <a:noFill/>
+          <a:ln w="0">
+            <a:noFill/>
+          </a:ln>
+        </p:spPr>
+        <p:txBody>
+          <a:bodyPr lIns="0" rIns="0" tIns="0" bIns="0" anchor="t">
             <a:normAutofit/>
           </a:bodyPr>
           <a:p>
@@ -1157,12 +1250,12 @@
       </p:sp>
       <p:sp>
         <p:nvSpPr>
-          <p:cNvPr id="6" name="PlaceHolder 3"/>
-          <p:cNvSpPr>
-            <a:spLocks noGrp="1"/>
-          </p:cNvSpPr>
-          <p:nvPr>
-            <p:ph type="body"/>
+          <p:cNvPr id="8" name="PlaceHolder 3"/>
+          <p:cNvSpPr>
+            <a:spLocks noGrp="1"/>
+          </p:cNvSpPr>
+          <p:nvPr>
+            <p:ph/>
           </p:nvPr>
         </p:nvSpPr>
         <p:spPr>
@@ -1173,9 +1266,13 @@
           <a:prstGeom prst="rect">
             <a:avLst/>
           </a:prstGeom>
-        </p:spPr>
-        <p:txBody>
-          <a:bodyPr lIns="0" rIns="0" tIns="0" bIns="0">
+          <a:noFill/>
+          <a:ln w="0">
+            <a:noFill/>
+          </a:ln>
+        </p:spPr>
+        <p:txBody>
+          <a:bodyPr lIns="0" rIns="0" tIns="0" bIns="0" anchor="t">
             <a:normAutofit/>
           </a:bodyPr>
           <a:p>
@@ -1209,7 +1306,7 @@
       </p:grpSpPr>
       <p:sp>
         <p:nvSpPr>
-          <p:cNvPr id="7" name="PlaceHolder 1"/>
+          <p:cNvPr id="9" name="PlaceHolder 1"/>
           <p:cNvSpPr>
             <a:spLocks noGrp="1"/>
           </p:cNvSpPr>
@@ -1225,13 +1322,19 @@
           <a:prstGeom prst="rect">
             <a:avLst/>
           </a:prstGeom>
+          <a:noFill/>
+          <a:ln w="0">
+            <a:noFill/>
+          </a:ln>
         </p:spPr>
         <p:txBody>
           <a:bodyPr lIns="0" rIns="0" tIns="0" bIns="0" anchor="ctr">
-            <a:spAutoFit/>
-          </a:bodyPr>
-          <a:p>
-            <a:pPr algn="ctr"/>
+            <a:noAutofit/>
+          </a:bodyPr>
+          <a:p>
+            <a:pPr algn="ctr">
+              <a:buNone/>
+            </a:pPr>
             <a:endParaRPr b="0" lang="en-US" sz="4400" spc="-1" strike="noStrike">
               <a:latin typeface="Arial"/>
             </a:endParaRPr>
@@ -1262,7 +1365,7 @@
       </p:grpSpPr>
       <p:sp>
         <p:nvSpPr>
-          <p:cNvPr id="8" name="PlaceHolder 1"/>
+          <p:cNvPr id="10" name="PlaceHolder 1"/>
           <p:cNvSpPr>
             <a:spLocks noGrp="1"/>
           </p:cNvSpPr>
@@ -1278,13 +1381,19 @@
           <a:prstGeom prst="rect">
             <a:avLst/>
           </a:prstGeom>
+          <a:noFill/>
+          <a:ln w="0">
+            <a:noFill/>
+          </a:ln>
         </p:spPr>
         <p:txBody>
           <a:bodyPr lIns="0" rIns="0" tIns="0" bIns="0" anchor="ctr">
-            <a:spAutoFit/>
-          </a:bodyPr>
-          <a:p>
-            <a:pPr algn="ctr"/>
+            <a:noAutofit/>
+          </a:bodyPr>
+          <a:p>
+            <a:pPr algn="ctr">
+              <a:buNone/>
+            </a:pPr>
             <a:endParaRPr b="0" lang="en-US" sz="3200" spc="-1" strike="noStrike">
               <a:latin typeface="Arial"/>
             </a:endParaRPr>
@@ -1315,7 +1424,7 @@
       </p:grpSpPr>
       <p:sp>
         <p:nvSpPr>
-          <p:cNvPr id="9" name="PlaceHolder 1"/>
+          <p:cNvPr id="11" name="PlaceHolder 1"/>
           <p:cNvSpPr>
             <a:spLocks noGrp="1"/>
           </p:cNvSpPr>
@@ -1331,13 +1440,19 @@
           <a:prstGeom prst="rect">
             <a:avLst/>
           </a:prstGeom>
+          <a:noFill/>
+          <a:ln w="0">
+            <a:noFill/>
+          </a:ln>
         </p:spPr>
         <p:txBody>
           <a:bodyPr lIns="0" rIns="0" tIns="0" bIns="0" anchor="ctr">
-            <a:spAutoFit/>
-          </a:bodyPr>
-          <a:p>
-            <a:pPr algn="ctr"/>
+            <a:noAutofit/>
+          </a:bodyPr>
+          <a:p>
+            <a:pPr algn="ctr">
+              <a:buNone/>
+            </a:pPr>
             <a:endParaRPr b="0" lang="en-US" sz="4400" spc="-1" strike="noStrike">
               <a:latin typeface="Arial"/>
             </a:endParaRPr>
@@ -1346,12 +1461,12 @@
       </p:sp>
       <p:sp>
         <p:nvSpPr>
-          <p:cNvPr id="10" name="PlaceHolder 2"/>
-          <p:cNvSpPr>
-            <a:spLocks noGrp="1"/>
-          </p:cNvSpPr>
-          <p:nvPr>
-            <p:ph type="body"/>
+          <p:cNvPr id="12" name="PlaceHolder 2"/>
+          <p:cNvSpPr>
+            <a:spLocks noGrp="1"/>
+          </p:cNvSpPr>
+          <p:nvPr>
+            <p:ph/>
           </p:nvPr>
         </p:nvSpPr>
         <p:spPr>
@@ -1362,9 +1477,13 @@
           <a:prstGeom prst="rect">
             <a:avLst/>
           </a:prstGeom>
-        </p:spPr>
-        <p:txBody>
-          <a:bodyPr lIns="0" rIns="0" tIns="0" bIns="0">
+          <a:noFill/>
+          <a:ln w="0">
+            <a:noFill/>
+          </a:ln>
+        </p:spPr>
+        <p:txBody>
+          <a:bodyPr lIns="0" rIns="0" tIns="0" bIns="0" anchor="t">
             <a:normAutofit/>
           </a:bodyPr>
           <a:p>
@@ -1376,12 +1495,12 @@
       </p:sp>
       <p:sp>
         <p:nvSpPr>
-          <p:cNvPr id="11" name="PlaceHolder 3"/>
-          <p:cNvSpPr>
-            <a:spLocks noGrp="1"/>
-          </p:cNvSpPr>
-          <p:nvPr>
-            <p:ph type="body"/>
+          <p:cNvPr id="13" name="PlaceHolder 3"/>
+          <p:cNvSpPr>
+            <a:spLocks noGrp="1"/>
+          </p:cNvSpPr>
+          <p:nvPr>
+            <p:ph/>
           </p:nvPr>
         </p:nvSpPr>
         <p:spPr>
@@ -1392,9 +1511,13 @@
           <a:prstGeom prst="rect">
             <a:avLst/>
           </a:prstGeom>
-        </p:spPr>
-        <p:txBody>
-          <a:bodyPr lIns="0" rIns="0" tIns="0" bIns="0">
+          <a:noFill/>
+          <a:ln w="0">
+            <a:noFill/>
+          </a:ln>
+        </p:spPr>
+        <p:txBody>
+          <a:bodyPr lIns="0" rIns="0" tIns="0" bIns="0" anchor="t">
             <a:normAutofit/>
           </a:bodyPr>
           <a:p>
@@ -1406,12 +1529,12 @@
       </p:sp>
       <p:sp>
         <p:nvSpPr>
-          <p:cNvPr id="12" name="PlaceHolder 4"/>
-          <p:cNvSpPr>
-            <a:spLocks noGrp="1"/>
-          </p:cNvSpPr>
-          <p:nvPr>
-            <p:ph type="body"/>
+          <p:cNvPr id="14" name="PlaceHolder 4"/>
+          <p:cNvSpPr>
+            <a:spLocks noGrp="1"/>
+          </p:cNvSpPr>
+          <p:nvPr>
+            <p:ph/>
           </p:nvPr>
         </p:nvSpPr>
         <p:spPr>
@@ -1422,9 +1545,13 @@
           <a:prstGeom prst="rect">
             <a:avLst/>
           </a:prstGeom>
-        </p:spPr>
-        <p:txBody>
-          <a:bodyPr lIns="0" rIns="0" tIns="0" bIns="0">
+          <a:noFill/>
+          <a:ln w="0">
+            <a:noFill/>
+          </a:ln>
+        </p:spPr>
+        <p:txBody>
+          <a:bodyPr lIns="0" rIns="0" tIns="0" bIns="0" anchor="t">
             <a:normAutofit/>
           </a:bodyPr>
           <a:p>
@@ -1458,7 +1585,7 @@
       </p:grpSpPr>
       <p:sp>
         <p:nvSpPr>
-          <p:cNvPr id="13" name="PlaceHolder 1"/>
+          <p:cNvPr id="15" name="PlaceHolder 1"/>
           <p:cNvSpPr>
             <a:spLocks noGrp="1"/>
           </p:cNvSpPr>
@@ -1474,13 +1601,19 @@
           <a:prstGeom prst="rect">
             <a:avLst/>
           </a:prstGeom>
+          <a:noFill/>
+          <a:ln w="0">
+            <a:noFill/>
+          </a:ln>
         </p:spPr>
         <p:txBody>
           <a:bodyPr lIns="0" rIns="0" tIns="0" bIns="0" anchor="ctr">
-            <a:spAutoFit/>
-          </a:bodyPr>
-          <a:p>
-            <a:pPr algn="ctr"/>
+            <a:noAutofit/>
+          </a:bodyPr>
+          <a:p>
+            <a:pPr algn="ctr">
+              <a:buNone/>
+            </a:pPr>
             <a:endParaRPr b="0" lang="en-US" sz="4400" spc="-1" strike="noStrike">
               <a:latin typeface="Arial"/>
             </a:endParaRPr>
@@ -1489,12 +1622,12 @@
       </p:sp>
       <p:sp>
         <p:nvSpPr>
-          <p:cNvPr id="14" name="PlaceHolder 2"/>
-          <p:cNvSpPr>
-            <a:spLocks noGrp="1"/>
-          </p:cNvSpPr>
-          <p:nvPr>
-            <p:ph type="body"/>
+          <p:cNvPr id="16" name="PlaceHolder 2"/>
+          <p:cNvSpPr>
+            <a:spLocks noGrp="1"/>
+          </p:cNvSpPr>
+          <p:nvPr>
+            <p:ph/>
           </p:nvPr>
         </p:nvSpPr>
         <p:spPr>
@@ -1505,9 +1638,13 @@
           <a:prstGeom prst="rect">
             <a:avLst/>
           </a:prstGeom>
-        </p:spPr>
-        <p:txBody>
-          <a:bodyPr lIns="0" rIns="0" tIns="0" bIns="0">
+          <a:noFill/>
+          <a:ln w="0">
+            <a:noFill/>
+          </a:ln>
+        </p:spPr>
+        <p:txBody>
+          <a:bodyPr lIns="0" rIns="0" tIns="0" bIns="0" anchor="t">
             <a:normAutofit/>
           </a:bodyPr>
           <a:p>
@@ -1519,12 +1656,12 @@
       </p:sp>
       <p:sp>
         <p:nvSpPr>
-          <p:cNvPr id="15" name="PlaceHolder 3"/>
-          <p:cNvSpPr>
-            <a:spLocks noGrp="1"/>
-          </p:cNvSpPr>
-          <p:nvPr>
-            <p:ph type="body"/>
+          <p:cNvPr id="17" name="PlaceHolder 3"/>
+          <p:cNvSpPr>
+            <a:spLocks noGrp="1"/>
+          </p:cNvSpPr>
+          <p:nvPr>
+            <p:ph/>
           </p:nvPr>
         </p:nvSpPr>
         <p:spPr>
@@ -1535,9 +1672,13 @@
           <a:prstGeom prst="rect">
             <a:avLst/>
           </a:prstGeom>
-        </p:spPr>
-        <p:txBody>
-          <a:bodyPr lIns="0" rIns="0" tIns="0" bIns="0">
+          <a:noFill/>
+          <a:ln w="0">
+            <a:noFill/>
+          </a:ln>
+        </p:spPr>
+        <p:txBody>
+          <a:bodyPr lIns="0" rIns="0" tIns="0" bIns="0" anchor="t">
             <a:normAutofit/>
           </a:bodyPr>
           <a:p>
@@ -1549,12 +1690,12 @@
       </p:sp>
       <p:sp>
         <p:nvSpPr>
-          <p:cNvPr id="16" name="PlaceHolder 4"/>
-          <p:cNvSpPr>
-            <a:spLocks noGrp="1"/>
-          </p:cNvSpPr>
-          <p:nvPr>
-            <p:ph type="body"/>
+          <p:cNvPr id="18" name="PlaceHolder 4"/>
+          <p:cNvSpPr>
+            <a:spLocks noGrp="1"/>
+          </p:cNvSpPr>
+          <p:nvPr>
+            <p:ph/>
           </p:nvPr>
         </p:nvSpPr>
         <p:spPr>
@@ -1565,9 +1706,13 @@
           <a:prstGeom prst="rect">
             <a:avLst/>
           </a:prstGeom>
-        </p:spPr>
-        <p:txBody>
-          <a:bodyPr lIns="0" rIns="0" tIns="0" bIns="0">
+          <a:noFill/>
+          <a:ln w="0">
+            <a:noFill/>
+          </a:ln>
+        </p:spPr>
+        <p:txBody>
+          <a:bodyPr lIns="0" rIns="0" tIns="0" bIns="0" anchor="t">
             <a:normAutofit/>
           </a:bodyPr>
           <a:p>
@@ -1601,7 +1746,7 @@
       </p:grpSpPr>
       <p:sp>
         <p:nvSpPr>
-          <p:cNvPr id="17" name="PlaceHolder 1"/>
+          <p:cNvPr id="19" name="PlaceHolder 1"/>
           <p:cNvSpPr>
             <a:spLocks noGrp="1"/>
           </p:cNvSpPr>
@@ -1617,13 +1762,19 @@
           <a:prstGeom prst="rect">
             <a:avLst/>
           </a:prstGeom>
+          <a:noFill/>
+          <a:ln w="0">
+            <a:noFill/>
+          </a:ln>
         </p:spPr>
         <p:txBody>
           <a:bodyPr lIns="0" rIns="0" tIns="0" bIns="0" anchor="ctr">
-            <a:spAutoFit/>
-          </a:bodyPr>
-          <a:p>
-            <a:pPr algn="ctr"/>
+            <a:noAutofit/>
+          </a:bodyPr>
+          <a:p>
+            <a:pPr algn="ctr">
+              <a:buNone/>
+            </a:pPr>
             <a:endParaRPr b="0" lang="en-US" sz="4400" spc="-1" strike="noStrike">
               <a:latin typeface="Arial"/>
             </a:endParaRPr>
@@ -1632,12 +1783,12 @@
       </p:sp>
       <p:sp>
         <p:nvSpPr>
-          <p:cNvPr id="18" name="PlaceHolder 2"/>
-          <p:cNvSpPr>
-            <a:spLocks noGrp="1"/>
-          </p:cNvSpPr>
-          <p:nvPr>
-            <p:ph type="body"/>
+          <p:cNvPr id="20" name="PlaceHolder 2"/>
+          <p:cNvSpPr>
+            <a:spLocks noGrp="1"/>
+          </p:cNvSpPr>
+          <p:nvPr>
+            <p:ph/>
           </p:nvPr>
         </p:nvSpPr>
         <p:spPr>
@@ -1648,9 +1799,13 @@
           <a:prstGeom prst="rect">
             <a:avLst/>
           </a:prstGeom>
-        </p:spPr>
-        <p:txBody>
-          <a:bodyPr lIns="0" rIns="0" tIns="0" bIns="0">
+          <a:noFill/>
+          <a:ln w="0">
+            <a:noFill/>
+          </a:ln>
+        </p:spPr>
+        <p:txBody>
+          <a:bodyPr lIns="0" rIns="0" tIns="0" bIns="0" anchor="t">
             <a:normAutofit/>
           </a:bodyPr>
           <a:p>
@@ -1662,12 +1817,12 @@
       </p:sp>
       <p:sp>
         <p:nvSpPr>
-          <p:cNvPr id="19" name="PlaceHolder 3"/>
-          <p:cNvSpPr>
-            <a:spLocks noGrp="1"/>
-          </p:cNvSpPr>
-          <p:nvPr>
-            <p:ph type="body"/>
+          <p:cNvPr id="21" name="PlaceHolder 3"/>
+          <p:cNvSpPr>
+            <a:spLocks noGrp="1"/>
+          </p:cNvSpPr>
+          <p:nvPr>
+            <p:ph/>
           </p:nvPr>
         </p:nvSpPr>
         <p:spPr>
@@ -1678,9 +1833,13 @@
           <a:prstGeom prst="rect">
             <a:avLst/>
           </a:prstGeom>
-        </p:spPr>
-        <p:txBody>
-          <a:bodyPr lIns="0" rIns="0" tIns="0" bIns="0">
+          <a:noFill/>
+          <a:ln w="0">
+            <a:noFill/>
+          </a:ln>
+        </p:spPr>
+        <p:txBody>
+          <a:bodyPr lIns="0" rIns="0" tIns="0" bIns="0" anchor="t">
             <a:normAutofit/>
           </a:bodyPr>
           <a:p>
@@ -1692,12 +1851,12 @@
       </p:sp>
       <p:sp>
         <p:nvSpPr>
-          <p:cNvPr id="20" name="PlaceHolder 4"/>
-          <p:cNvSpPr>
-            <a:spLocks noGrp="1"/>
-          </p:cNvSpPr>
-          <p:nvPr>
-            <p:ph type="body"/>
+          <p:cNvPr id="22" name="PlaceHolder 4"/>
+          <p:cNvSpPr>
+            <a:spLocks noGrp="1"/>
+          </p:cNvSpPr>
+          <p:nvPr>
+            <p:ph/>
           </p:nvPr>
         </p:nvSpPr>
         <p:spPr>
@@ -1708,9 +1867,13 @@
           <a:prstGeom prst="rect">
             <a:avLst/>
           </a:prstGeom>
-        </p:spPr>
-        <p:txBody>
-          <a:bodyPr lIns="0" rIns="0" tIns="0" bIns="0">
+          <a:noFill/>
+          <a:ln w="0">
+            <a:noFill/>
+          </a:ln>
+        </p:spPr>
+        <p:txBody>
+          <a:bodyPr lIns="0" rIns="0" tIns="0" bIns="0" anchor="t">
             <a:normAutofit/>
           </a:bodyPr>
           <a:p>
@@ -1742,6 +1905,232 @@
           <a:chExt cx="0" cy="0"/>
         </a:xfrm>
       </p:grpSpPr>
+      <p:sp>
+        <p:nvSpPr>
+          <p:cNvPr id="0" name="PlaceHolder 1"/>
+          <p:cNvSpPr>
+            <a:spLocks noGrp="1"/>
+          </p:cNvSpPr>
+          <p:nvPr>
+            <p:ph type="title"/>
+          </p:nvPr>
+        </p:nvSpPr>
+        <p:spPr>
+          <a:xfrm>
+            <a:off x="504000" y="226080"/>
+            <a:ext cx="9072000" cy="946440"/>
+          </a:xfrm>
+          <a:prstGeom prst="rect">
+            <a:avLst/>
+          </a:prstGeom>
+          <a:noFill/>
+          <a:ln w="0">
+            <a:noFill/>
+          </a:ln>
+        </p:spPr>
+        <p:txBody>
+          <a:bodyPr lIns="0" rIns="0" tIns="0" bIns="0" anchor="ctr">
+            <a:noAutofit/>
+          </a:bodyPr>
+          <a:p>
+            <a:pPr algn="ctr">
+              <a:buNone/>
+            </a:pPr>
+            <a:r>
+              <a:rPr b="0" lang="en-US" sz="4400" spc="-1" strike="noStrike">
+                <a:latin typeface="Arial"/>
+              </a:rPr>
+              <a:t>Click to edit the title text format</a:t>
+            </a:r>
+            <a:endParaRPr b="0" lang="en-US" sz="4400" spc="-1" strike="noStrike">
+              <a:latin typeface="Arial"/>
+            </a:endParaRPr>
+          </a:p>
+        </p:txBody>
+      </p:sp>
+      <p:sp>
+        <p:nvSpPr>
+          <p:cNvPr id="1" name="PlaceHolder 2"/>
+          <p:cNvSpPr>
+            <a:spLocks noGrp="1"/>
+          </p:cNvSpPr>
+          <p:nvPr>
+            <p:ph type="body"/>
+          </p:nvPr>
+        </p:nvSpPr>
+        <p:spPr>
+          <a:xfrm>
+            <a:off x="504000" y="1326600"/>
+            <a:ext cx="9072000" cy="3288600"/>
+          </a:xfrm>
+          <a:prstGeom prst="rect">
+            <a:avLst/>
+          </a:prstGeom>
+          <a:noFill/>
+          <a:ln w="0">
+            <a:noFill/>
+          </a:ln>
+        </p:spPr>
+        <p:txBody>
+          <a:bodyPr lIns="0" rIns="0" tIns="0" bIns="0" anchor="t">
+            <a:normAutofit/>
+          </a:bodyPr>
+          <a:p>
+            <a:pPr marL="432000" indent="-324000">
+              <a:spcBef>
+                <a:spcPts val="1417"/>
+              </a:spcBef>
+              <a:buClr>
+                <a:srgbClr val="000000"/>
+              </a:buClr>
+              <a:buSzPct val="45000"/>
+              <a:buFont typeface="Wingdings" charset="2"/>
+              <a:buChar char=""/>
+            </a:pPr>
+            <a:r>
+              <a:rPr b="0" lang="en-US" sz="3200" spc="-1" strike="noStrike">
+                <a:latin typeface="Arial"/>
+              </a:rPr>
+              <a:t>Click to edit the outline text format</a:t>
+            </a:r>
+            <a:endParaRPr b="0" lang="en-US" sz="3200" spc="-1" strike="noStrike">
+              <a:latin typeface="Arial"/>
+            </a:endParaRPr>
+          </a:p>
+          <a:p>
+            <a:pPr lvl="1" marL="864000" indent="-324000">
+              <a:spcBef>
+                <a:spcPts val="1134"/>
+              </a:spcBef>
+              <a:buClr>
+                <a:srgbClr val="000000"/>
+              </a:buClr>
+              <a:buSzPct val="75000"/>
+              <a:buFont typeface="Symbol" charset="2"/>
+              <a:buChar char=""/>
+            </a:pPr>
+            <a:r>
+              <a:rPr b="0" lang="en-US" sz="2800" spc="-1" strike="noStrike">
+                <a:latin typeface="Arial"/>
+              </a:rPr>
+              <a:t>Second Outline Level</a:t>
+            </a:r>
+            <a:endParaRPr b="0" lang="en-US" sz="2800" spc="-1" strike="noStrike">
+              <a:latin typeface="Arial"/>
+            </a:endParaRPr>
+          </a:p>
+          <a:p>
+            <a:pPr lvl="2" marL="1296000" indent="-288000">
+              <a:spcBef>
+                <a:spcPts val="850"/>
+              </a:spcBef>
+              <a:buClr>
+                <a:srgbClr val="000000"/>
+              </a:buClr>
+              <a:buSzPct val="45000"/>
+              <a:buFont typeface="Wingdings" charset="2"/>
+              <a:buChar char=""/>
+            </a:pPr>
+            <a:r>
+              <a:rPr b="0" lang="en-US" sz="2400" spc="-1" strike="noStrike">
+                <a:latin typeface="Arial"/>
+              </a:rPr>
+              <a:t>Third Outline Level</a:t>
+            </a:r>
+            <a:endParaRPr b="0" lang="en-US" sz="2400" spc="-1" strike="noStrike">
+              <a:latin typeface="Arial"/>
+            </a:endParaRPr>
+          </a:p>
+          <a:p>
+            <a:pPr lvl="3" marL="1728000" indent="-216000">
+              <a:spcBef>
+                <a:spcPts val="567"/>
+              </a:spcBef>
+              <a:buClr>
+                <a:srgbClr val="000000"/>
+              </a:buClr>
+              <a:buSzPct val="75000"/>
+              <a:buFont typeface="Symbol" charset="2"/>
+              <a:buChar char=""/>
+            </a:pPr>
+            <a:r>
+              <a:rPr b="0" lang="en-US" sz="2000" spc="-1" strike="noStrike">
+                <a:latin typeface="Arial"/>
+              </a:rPr>
+              <a:t>Fourth Outline Level</a:t>
+            </a:r>
+            <a:endParaRPr b="0" lang="en-US" sz="2000" spc="-1" strike="noStrike">
+              <a:latin typeface="Arial"/>
+            </a:endParaRPr>
+          </a:p>
+          <a:p>
+            <a:pPr lvl="4" marL="2160000" indent="-216000">
+              <a:spcBef>
+                <a:spcPts val="283"/>
+              </a:spcBef>
+              <a:buClr>
+                <a:srgbClr val="000000"/>
+              </a:buClr>
+              <a:buSzPct val="45000"/>
+              <a:buFont typeface="Wingdings" charset="2"/>
+              <a:buChar char=""/>
+            </a:pPr>
+            <a:r>
+              <a:rPr b="0" lang="en-US" sz="2000" spc="-1" strike="noStrike">
+                <a:latin typeface="Arial"/>
+              </a:rPr>
+              <a:t>Fifth Outline Level</a:t>
+            </a:r>
+            <a:endParaRPr b="0" lang="en-US" sz="2000" spc="-1" strike="noStrike">
+              <a:latin typeface="Arial"/>
+            </a:endParaRPr>
+          </a:p>
+          <a:p>
+            <a:pPr lvl="5" marL="2592000" indent="-216000">
+              <a:spcBef>
+                <a:spcPts val="283"/>
+              </a:spcBef>
+              <a:buClr>
+                <a:srgbClr val="000000"/>
+              </a:buClr>
+              <a:buSzPct val="45000"/>
+              <a:buFont typeface="Wingdings" charset="2"/>
+              <a:buChar char=""/>
+            </a:pPr>
+            <a:r>
+              <a:rPr b="0" lang="en-US" sz="2000" spc="-1" strike="noStrike">
+                <a:latin typeface="Arial"/>
+              </a:rPr>
+              <a:t>Sixth Outline Level</a:t>
+            </a:r>
+            <a:endParaRPr b="0" lang="en-US" sz="2000" spc="-1" strike="noStrike">
+              <a:latin typeface="Arial"/>
+            </a:endParaRPr>
+          </a:p>
+          <a:p>
+            <a:pPr lvl="6" marL="3024000" indent="-216000">
+              <a:spcBef>
+                <a:spcPts val="283"/>
+              </a:spcBef>
+              <a:buClr>
+                <a:srgbClr val="000000"/>
+              </a:buClr>
+              <a:buSzPct val="45000"/>
+              <a:buFont typeface="Wingdings" charset="2"/>
+              <a:buChar char=""/>
+            </a:pPr>
+            <a:r>
+              <a:rPr b="0" lang="en-US" sz="2000" spc="-1" strike="noStrike">
+                <a:latin typeface="Arial"/>
+              </a:rPr>
+              <a:t>Seventh Outline Level</a:t>
+            </a:r>
+            <a:endParaRPr b="0" lang="en-US" sz="2000" spc="-1" strike="noStrike">
+              <a:latin typeface="Arial"/>
+            </a:endParaRPr>
+          </a:p>
+        </p:txBody>
+      </p:sp>
     </p:spTree>
   </p:cSld>
   <p:clrMap bg1="lt1" bg2="lt2" tx1="dk1" tx2="dk2" accent1="accent1" accent2="accent2" accent3="accent3" accent4="accent4" accent5="accent5" accent6="accent6" hlink="hlink" folHlink="folHlink"/>
@@ -1788,20 +2177,20 @@
       </p:grpSpPr>
       <p:sp>
         <p:nvSpPr>
-          <p:cNvPr id="36" name="CustomShape 1"/>
+          <p:cNvPr id="38" name="CustomShape 1"/>
           <p:cNvSpPr/>
           <p:nvPr/>
         </p:nvSpPr>
         <p:spPr>
           <a:xfrm>
             <a:off x="504000" y="363600"/>
-            <a:ext cx="9068760" cy="669600"/>
-          </a:xfrm>
-          <a:prstGeom prst="rect">
-            <a:avLst/>
-          </a:prstGeom>
-          <a:noFill/>
-          <a:ln>
+            <a:ext cx="9068400" cy="669600"/>
+          </a:xfrm>
+          <a:prstGeom prst="rect">
+            <a:avLst/>
+          </a:prstGeom>
+          <a:noFill/>
+          <a:ln w="0">
             <a:noFill/>
           </a:ln>
         </p:spPr>
@@ -1820,6 +2209,7 @@
               <a:lnSpc>
                 <a:spcPct val="100000"/>
               </a:lnSpc>
+              <a:buNone/>
             </a:pPr>
             <a:r>
               <a:rPr b="0" lang="en-US" sz="4400" spc="-1" strike="noStrike">
@@ -1829,7 +2219,7 @@
                 <a:latin typeface="Arial"/>
                 <a:ea typeface="DejaVu Sans"/>
               </a:rPr>
-              <a:t>GHG emissions reported</a:t>
+              <a:t>{{title}}</a:t>
             </a:r>
             <a:endParaRPr b="0" lang="en-US" sz="4400" spc="-1" strike="noStrike">
               <a:latin typeface="Arial"/>
@@ -1839,20 +2229,20 @@
       </p:sp>
       <p:sp>
         <p:nvSpPr>
-          <p:cNvPr id="37" name="CustomShape 2"/>
+          <p:cNvPr id="39" name="CustomShape 2"/>
           <p:cNvSpPr/>
           <p:nvPr/>
         </p:nvSpPr>
         <p:spPr>
           <a:xfrm>
             <a:off x="504000" y="1326600"/>
-            <a:ext cx="9068760" cy="3285360"/>
-          </a:xfrm>
-          <a:prstGeom prst="rect">
-            <a:avLst/>
-          </a:prstGeom>
-          <a:noFill/>
-          <a:ln>
+            <a:ext cx="9068400" cy="3285000"/>
+          </a:xfrm>
+          <a:prstGeom prst="rect">
+            <a:avLst/>
+          </a:prstGeom>
+          <a:noFill/>
+          <a:ln w="0">
             <a:noFill/>
           </a:ln>
         </p:spPr>
@@ -1865,13 +2255,13 @@
       </p:sp>
       <p:graphicFrame>
         <p:nvGraphicFramePr>
-          <p:cNvPr id="38" name=""/>
+          <p:cNvPr id="40" name=""/>
           <p:cNvGraphicFramePr/>
           <p:nvPr/>
         </p:nvGraphicFramePr>
         <p:xfrm>
           <a:off x="2174400" y="1984320"/>
-          <a:ext cx="5753520" cy="3227400"/>
+          <a:ext cx="5753160" cy="3227040"/>
         </p:xfrm>
         <a:graphic>
           <a:graphicData uri="http://schemas.openxmlformats.org/drawingml/2006/chart">
@@ -1881,20 +2271,20 @@
       </p:graphicFrame>
       <p:sp>
         <p:nvSpPr>
-          <p:cNvPr id="39" name="CustomShape 3"/>
+          <p:cNvPr id="41" name="CustomShape 3"/>
           <p:cNvSpPr/>
           <p:nvPr/>
         </p:nvSpPr>
         <p:spPr>
           <a:xfrm>
             <a:off x="3931920" y="1041120"/>
-            <a:ext cx="1765440" cy="363960"/>
-          </a:xfrm>
-          <a:prstGeom prst="rect">
-            <a:avLst/>
-          </a:prstGeom>
-          <a:noFill/>
-          <a:ln>
+            <a:ext cx="1765080" cy="363960"/>
+          </a:xfrm>
+          <a:prstGeom prst="rect">
+            <a:avLst/>
+          </a:prstGeom>
+          <a:noFill/>
+          <a:ln w="0">
             <a:noFill/>
           </a:ln>
         </p:spPr>
@@ -1905,7 +2295,7 @@
           <a:fontRef idx="minor"/>
         </p:style>
         <p:txBody>
-          <a:bodyPr lIns="90000" rIns="90000" tIns="45000" bIns="45000">
+          <a:bodyPr lIns="90000" rIns="90000" tIns="45000" bIns="45000" anchor="t">
             <a:spAutoFit/>
           </a:bodyPr>
           <a:p>
@@ -1913,10 +2303,15 @@
               <a:lnSpc>
                 <a:spcPct val="100000"/>
               </a:lnSpc>
+              <a:buNone/>
             </a:pPr>
             <a:r>
               <a:rPr b="0" lang="en-US" sz="1800" spc="-1" strike="noStrike">
+                <a:solidFill>
+                  <a:srgbClr val="000000"/>
+                </a:solidFill>
                 <a:latin typeface="Arial"/>
+                <a:ea typeface="DejaVu Sans"/>
               </a:rPr>
               <a:t>(% of suppliers)</a:t>
             </a:r>
@@ -1928,20 +2323,20 @@
       </p:sp>
       <p:sp>
         <p:nvSpPr>
-          <p:cNvPr id="40" name="CustomShape 4"/>
+          <p:cNvPr id="42" name="CustomShape 4"/>
           <p:cNvSpPr/>
           <p:nvPr/>
         </p:nvSpPr>
         <p:spPr>
           <a:xfrm>
             <a:off x="1645920" y="1406880"/>
-            <a:ext cx="6674760" cy="363960"/>
-          </a:xfrm>
-          <a:prstGeom prst="rect">
-            <a:avLst/>
-          </a:prstGeom>
-          <a:noFill/>
-          <a:ln>
+            <a:ext cx="6674400" cy="363960"/>
+          </a:xfrm>
+          <a:prstGeom prst="rect">
+            <a:avLst/>
+          </a:prstGeom>
+          <a:noFill/>
+          <a:ln w="0">
             <a:noFill/>
           </a:ln>
         </p:spPr>
@@ -1952,7 +2347,7 @@
           <a:fontRef idx="minor"/>
         </p:style>
         <p:txBody>
-          <a:bodyPr lIns="90000" rIns="90000" tIns="45000" bIns="45000">
+          <a:bodyPr lIns="90000" rIns="90000" tIns="45000" bIns="45000" anchor="t">
             <a:spAutoFit/>
           </a:bodyPr>
           <a:p>
@@ -1960,12 +2355,17 @@
               <a:lnSpc>
                 <a:spcPct val="100000"/>
               </a:lnSpc>
+              <a:buNone/>
             </a:pPr>
             <a:r>
               <a:rPr b="0" lang="en-US" sz="1800" spc="-1" strike="noStrike">
+                <a:solidFill>
+                  <a:srgbClr val="000000"/>
+                </a:solidFill>
                 <a:latin typeface="Arial"/>
+                <a:ea typeface="DejaVu Sans"/>
               </a:rPr>
-              <a:t>(outer: member, inner: alliance)</a:t>
+              <a:t>outer to inner: {{accounts}}</a:t>
             </a:r>
             <a:endParaRPr b="0" lang="en-US" sz="1800" spc="-1" strike="noStrike">
               <a:latin typeface="Arial"/>

</xml_diff>

<commit_message>
fixes pptx download of insight charts
</commit_message>
<xml_diff>
--- a/djaopsp/templates/app/reporting/doughnut.pptx
+++ b/djaopsp/templates/app/reporting/doughnut.pptx
@@ -1,24 +1,160 @@
 
 <file path=ppt/presentation.xml><?xml version="1.0" encoding="utf-8"?>
-<p:presentation xmlns:a="http://schemas.openxmlformats.org/drawingml/2006/main" xmlns:p="http://schemas.openxmlformats.org/presentationml/2006/main" xmlns:r="http://schemas.openxmlformats.org/officeDocument/2006/relationships" xmlns:p14="http://schemas.microsoft.com/office/powerpoint/2010/main" xmlns:p15="http://schemas.microsoft.com/office/powerpoint/2012/main" xmlns:mc="http://schemas.openxmlformats.org/markup-compatibility/2006">
+<p:presentation xmlns:a="http://schemas.openxmlformats.org/drawingml/2006/main" xmlns:r="http://schemas.openxmlformats.org/officeDocument/2006/relationships" xmlns:p="http://schemas.openxmlformats.org/presentationml/2006/main">
   <p:sldMasterIdLst>
-    <p:sldMasterId id="2147483648" r:id="rId2"/>
+    <p:sldMasterId id="2147483648" r:id="rId1"/>
   </p:sldMasterIdLst>
   <p:sldIdLst>
-    <p:sldId id="256" r:id="rId3"/>
+    <p:sldId id="256" r:id="rId2"/>
   </p:sldIdLst>
   <p:sldSz cx="10080625" cy="5670550"/>
   <p:notesSz cx="7772400" cy="10058400"/>
+  <p:defaultTextStyle>
+    <a:defPPr>
+      <a:defRPr lang="en-US"/>
+    </a:defPPr>
+    <a:lvl1pPr marL="0" algn="l" defTabSz="914400" rtl="0" eaLnBrk="1" latinLnBrk="0" hangingPunct="1">
+      <a:defRPr sz="1800" kern="1200">
+        <a:solidFill>
+          <a:schemeClr val="tx1"/>
+        </a:solidFill>
+        <a:latin typeface="+mn-lt"/>
+        <a:ea typeface="+mn-ea"/>
+        <a:cs typeface="+mn-cs"/>
+      </a:defRPr>
+    </a:lvl1pPr>
+    <a:lvl2pPr marL="457200" algn="l" defTabSz="914400" rtl="0" eaLnBrk="1" latinLnBrk="0" hangingPunct="1">
+      <a:defRPr sz="1800" kern="1200">
+        <a:solidFill>
+          <a:schemeClr val="tx1"/>
+        </a:solidFill>
+        <a:latin typeface="+mn-lt"/>
+        <a:ea typeface="+mn-ea"/>
+        <a:cs typeface="+mn-cs"/>
+      </a:defRPr>
+    </a:lvl2pPr>
+    <a:lvl3pPr marL="914400" algn="l" defTabSz="914400" rtl="0" eaLnBrk="1" latinLnBrk="0" hangingPunct="1">
+      <a:defRPr sz="1800" kern="1200">
+        <a:solidFill>
+          <a:schemeClr val="tx1"/>
+        </a:solidFill>
+        <a:latin typeface="+mn-lt"/>
+        <a:ea typeface="+mn-ea"/>
+        <a:cs typeface="+mn-cs"/>
+      </a:defRPr>
+    </a:lvl3pPr>
+    <a:lvl4pPr marL="1371600" algn="l" defTabSz="914400" rtl="0" eaLnBrk="1" latinLnBrk="0" hangingPunct="1">
+      <a:defRPr sz="1800" kern="1200">
+        <a:solidFill>
+          <a:schemeClr val="tx1"/>
+        </a:solidFill>
+        <a:latin typeface="+mn-lt"/>
+        <a:ea typeface="+mn-ea"/>
+        <a:cs typeface="+mn-cs"/>
+      </a:defRPr>
+    </a:lvl4pPr>
+    <a:lvl5pPr marL="1828800" algn="l" defTabSz="914400" rtl="0" eaLnBrk="1" latinLnBrk="0" hangingPunct="1">
+      <a:defRPr sz="1800" kern="1200">
+        <a:solidFill>
+          <a:schemeClr val="tx1"/>
+        </a:solidFill>
+        <a:latin typeface="+mn-lt"/>
+        <a:ea typeface="+mn-ea"/>
+        <a:cs typeface="+mn-cs"/>
+      </a:defRPr>
+    </a:lvl5pPr>
+    <a:lvl6pPr marL="2286000" algn="l" defTabSz="914400" rtl="0" eaLnBrk="1" latinLnBrk="0" hangingPunct="1">
+      <a:defRPr sz="1800" kern="1200">
+        <a:solidFill>
+          <a:schemeClr val="tx1"/>
+        </a:solidFill>
+        <a:latin typeface="+mn-lt"/>
+        <a:ea typeface="+mn-ea"/>
+        <a:cs typeface="+mn-cs"/>
+      </a:defRPr>
+    </a:lvl6pPr>
+    <a:lvl7pPr marL="2743200" algn="l" defTabSz="914400" rtl="0" eaLnBrk="1" latinLnBrk="0" hangingPunct="1">
+      <a:defRPr sz="1800" kern="1200">
+        <a:solidFill>
+          <a:schemeClr val="tx1"/>
+        </a:solidFill>
+        <a:latin typeface="+mn-lt"/>
+        <a:ea typeface="+mn-ea"/>
+        <a:cs typeface="+mn-cs"/>
+      </a:defRPr>
+    </a:lvl7pPr>
+    <a:lvl8pPr marL="3200400" algn="l" defTabSz="914400" rtl="0" eaLnBrk="1" latinLnBrk="0" hangingPunct="1">
+      <a:defRPr sz="1800" kern="1200">
+        <a:solidFill>
+          <a:schemeClr val="tx1"/>
+        </a:solidFill>
+        <a:latin typeface="+mn-lt"/>
+        <a:ea typeface="+mn-ea"/>
+        <a:cs typeface="+mn-cs"/>
+      </a:defRPr>
+    </a:lvl8pPr>
+    <a:lvl9pPr marL="3657600" algn="l" defTabSz="914400" rtl="0" eaLnBrk="1" latinLnBrk="0" hangingPunct="1">
+      <a:defRPr sz="1800" kern="1200">
+        <a:solidFill>
+          <a:schemeClr val="tx1"/>
+        </a:solidFill>
+        <a:latin typeface="+mn-lt"/>
+        <a:ea typeface="+mn-ea"/>
+        <a:cs typeface="+mn-cs"/>
+      </a:defRPr>
+    </a:lvl9pPr>
+  </p:defaultTextStyle>
 </p:presentation>
 </file>
 
-<file path=ppt/charts/chart4.xml><?xml version="1.0" encoding="utf-8"?>
-<c:chartSpace xmlns:c="http://schemas.openxmlformats.org/drawingml/2006/chart" xmlns:a="http://schemas.openxmlformats.org/drawingml/2006/main" xmlns:r="http://schemas.openxmlformats.org/officeDocument/2006/relationships">
+<file path=ppt/revisionInfo.xml><?xml version="1.0" encoding="utf-8"?>
+<p1510:revInfo xmlns:a="http://schemas.openxmlformats.org/drawingml/2006/main" xmlns:r="http://schemas.openxmlformats.org/officeDocument/2006/relationships" xmlns:p1510="http://schemas.microsoft.com/office/powerpoint/2015/10/main">
+  <p1510:revLst>
+    <p1510:client id="{3E27BF99-55DE-68D0-5488-43FCBFA248C9}" v="16" dt="2024-08-26T16:41:30.828"/>
+    <p1510:client id="{F21098AA-34C2-8F25-5947-F58C4D64AA59}" v="10" dt="2024-08-26T18:56:31.968"/>
+  </p1510:revLst>
+</p1510:revInfo>
+</file>
+
+<file path=ppt/changesInfos/changesInfo1.xml><?xml version="1.0" encoding="utf-8"?>
+<pc:chgInfo xmlns:a="http://schemas.openxmlformats.org/drawingml/2006/main" xmlns:r="http://schemas.openxmlformats.org/officeDocument/2006/relationships" xmlns:ac="http://schemas.microsoft.com/office/drawing/2013/main/command" xmlns:pc="http://schemas.microsoft.com/office/powerpoint/2013/main/command">
+  <pc:docChgLst>
+    <pc:chgData name="Sebastien Mirolo" userId="S::smirolo@djaodjinteams.onmicrosoft.com::8bcf0d5a-5a29-4208-8379-14641edd2457" providerId="AD" clId="Web-{F21098AA-34C2-8F25-5947-F58C4D64AA59}"/>
+    <pc:docChg chg="modSld">
+      <pc:chgData name="Sebastien Mirolo" userId="S::smirolo@djaodjinteams.onmicrosoft.com::8bcf0d5a-5a29-4208-8379-14641edd2457" providerId="AD" clId="Web-{F21098AA-34C2-8F25-5947-F58C4D64AA59}" dt="2024-08-26T18:56:31.968" v="4" actId="20577"/>
+      <pc:docMkLst>
+        <pc:docMk/>
+      </pc:docMkLst>
+      <pc:sldChg chg="modSp">
+        <pc:chgData name="Sebastien Mirolo" userId="S::smirolo@djaodjinteams.onmicrosoft.com::8bcf0d5a-5a29-4208-8379-14641edd2457" providerId="AD" clId="Web-{F21098AA-34C2-8F25-5947-F58C4D64AA59}" dt="2024-08-26T18:56:31.968" v="4" actId="20577"/>
+        <pc:sldMkLst>
+          <pc:docMk/>
+          <pc:sldMk cId="0" sldId="256"/>
+        </pc:sldMkLst>
+        <pc:spChg chg="mod">
+          <ac:chgData name="Sebastien Mirolo" userId="S::smirolo@djaodjinteams.onmicrosoft.com::8bcf0d5a-5a29-4208-8379-14641edd2457" providerId="AD" clId="Web-{F21098AA-34C2-8F25-5947-F58C4D64AA59}" dt="2024-08-26T18:56:31.968" v="4" actId="20577"/>
+          <ac:spMkLst>
+            <pc:docMk/>
+            <pc:sldMk cId="0" sldId="256"/>
+            <ac:spMk id="41" creationId="{00000000-0000-0000-0000-000000000000}"/>
+          </ac:spMkLst>
+        </pc:spChg>
+      </pc:sldChg>
+    </pc:docChg>
+  </pc:docChgLst>
+</pc:chgInfo>
+</file>
+
+<file path=ppt/charts/chart1.xml><?xml version="1.0" encoding="utf-8"?>
+<c:chartSpace xmlns:c="http://schemas.openxmlformats.org/drawingml/2006/chart" xmlns:a="http://schemas.openxmlformats.org/drawingml/2006/main" xmlns:r="http://schemas.openxmlformats.org/officeDocument/2006/relationships" xmlns:c16r2="http://schemas.microsoft.com/office/drawing/2015/06/chart">
+  <c:date1904 val="1"/>
   <c:lang val="en-US"/>
   <c:roundedCorners val="0"/>
+  <c:style val="2"/>
   <c:chart>
     <c:autoTitleDeleted val="1"/>
     <c:plotArea>
+      <c:layout/>
       <c:doughnutChart>
         <c:varyColors val="1"/>
         <c:ser>
@@ -37,44 +173,56 @@
           </c:tx>
           <c:spPr>
             <a:solidFill>
-              <a:srgbClr val="3fa95f"/>
+              <a:srgbClr val="3FA95F"/>
             </a:solidFill>
             <a:ln w="0">
               <a:noFill/>
             </a:ln>
           </c:spPr>
-          <c:explosion val="0"/>
           <c:dPt>
             <c:idx val="0"/>
+            <c:bubble3D val="0"/>
             <c:spPr>
               <a:solidFill>
-                <a:srgbClr val="3fa95f"/>
+                <a:srgbClr val="3FA95F"/>
               </a:solidFill>
               <a:ln w="0">
                 <a:noFill/>
               </a:ln>
             </c:spPr>
+            <c:extLst>
+              <c:ext xmlns:c16="http://schemas.microsoft.com/office/drawing/2014/chart" uri="{C3380CC4-5D6E-409C-BE32-E72D297353CC}">
+                <c16:uniqueId val="{00000001-81CE-4DAF-A6CC-02AA206FE0A7}"/>
+              </c:ext>
+            </c:extLst>
           </c:dPt>
           <c:dPt>
             <c:idx val="1"/>
+            <c:bubble3D val="0"/>
             <c:spPr>
               <a:solidFill>
-                <a:srgbClr val="3ca65b"/>
+                <a:srgbClr val="3CA65B"/>
               </a:solidFill>
               <a:ln w="0">
                 <a:noFill/>
               </a:ln>
             </c:spPr>
+            <c:extLst>
+              <c:ext xmlns:c16="http://schemas.microsoft.com/office/drawing/2014/chart" uri="{C3380CC4-5D6E-409C-BE32-E72D297353CC}">
+                <c16:uniqueId val="{00000003-81CE-4DAF-A6CC-02AA206FE0A7}"/>
+              </c:ext>
+            </c:extLst>
           </c:dPt>
           <c:dLbls>
             <c:dLbl>
               <c:idx val="0"/>
+              <c:spPr/>
               <c:txPr>
                 <a:bodyPr wrap="square"/>
                 <a:lstStyle/>
                 <a:p>
                   <a:pPr>
-                    <a:defRPr b="0" sz="1000" spc="-1" strike="noStrike">
+                    <a:defRPr sz="1000" b="0" strike="noStrike" spc="-1">
                       <a:solidFill>
                         <a:srgbClr val="000000"/>
                       </a:solidFill>
@@ -82,6 +230,7 @@
                       <a:ea typeface="DejaVu Sans"/>
                     </a:defRPr>
                   </a:pPr>
+                  <a:endParaRPr lang="en-US"/>
                 </a:p>
               </c:txPr>
               <c:showLegendKey val="0"/>
@@ -89,16 +238,23 @@
               <c:showCatName val="0"/>
               <c:showSerName val="0"/>
               <c:showPercent val="0"/>
-              <c:separator> </c:separator>
+              <c:showBubbleSize val="1"/>
+              <c:extLst>
+                <c:ext xmlns:c15="http://schemas.microsoft.com/office/drawing/2012/chart" uri="{CE6537A1-D6FC-4f65-9D91-7224C49458BB}"/>
+                <c:ext xmlns:c16="http://schemas.microsoft.com/office/drawing/2014/chart" uri="{C3380CC4-5D6E-409C-BE32-E72D297353CC}">
+                  <c16:uniqueId val="{00000001-81CE-4DAF-A6CC-02AA206FE0A7}"/>
+                </c:ext>
+              </c:extLst>
             </c:dLbl>
             <c:dLbl>
               <c:idx val="1"/>
+              <c:spPr/>
               <c:txPr>
                 <a:bodyPr wrap="square"/>
                 <a:lstStyle/>
                 <a:p>
                   <a:pPr>
-                    <a:defRPr b="0" sz="1000" spc="-1" strike="noStrike">
+                    <a:defRPr sz="1000" b="0" strike="noStrike" spc="-1">
                       <a:solidFill>
                         <a:srgbClr val="000000"/>
                       </a:solidFill>
@@ -106,6 +262,7 @@
                       <a:ea typeface="DejaVu Sans"/>
                     </a:defRPr>
                   </a:pPr>
+                  <a:endParaRPr lang="en-US"/>
                 </a:p>
               </c:txPr>
               <c:showLegendKey val="0"/>
@@ -113,14 +270,27 @@
               <c:showCatName val="0"/>
               <c:showSerName val="0"/>
               <c:showPercent val="0"/>
-              <c:separator> </c:separator>
+              <c:showBubbleSize val="1"/>
+              <c:extLst>
+                <c:ext xmlns:c15="http://schemas.microsoft.com/office/drawing/2012/chart" uri="{CE6537A1-D6FC-4f65-9D91-7224C49458BB}"/>
+                <c:ext xmlns:c16="http://schemas.microsoft.com/office/drawing/2014/chart" uri="{C3380CC4-5D6E-409C-BE32-E72D297353CC}">
+                  <c16:uniqueId val="{00000003-81CE-4DAF-A6CC-02AA206FE0A7}"/>
+                </c:ext>
+              </c:extLst>
             </c:dLbl>
+            <c:spPr>
+              <a:noFill/>
+              <a:ln>
+                <a:noFill/>
+              </a:ln>
+              <a:effectLst/>
+            </c:spPr>
             <c:txPr>
               <a:bodyPr wrap="square"/>
               <a:lstStyle/>
               <a:p>
                 <a:pPr>
-                  <a:defRPr b="0" sz="1000" spc="-1" strike="noStrike">
+                  <a:defRPr sz="1000" b="0" strike="noStrike" spc="-1">
                     <a:solidFill>
                       <a:srgbClr val="000000"/>
                     </a:solidFill>
@@ -128,6 +298,7 @@
                     <a:ea typeface="DejaVu Sans"/>
                   </a:defRPr>
                 </a:pPr>
+                <a:endParaRPr lang="en-US"/>
               </a:p>
             </c:txPr>
             <c:showLegendKey val="0"/>
@@ -135,8 +306,12 @@
             <c:showCatName val="0"/>
             <c:showSerName val="0"/>
             <c:showPercent val="0"/>
+            <c:showBubbleSize val="1"/>
             <c:separator> </c:separator>
             <c:showLeaderLines val="0"/>
+            <c:extLst>
+              <c:ext xmlns:c15="http://schemas.microsoft.com/office/drawing/2012/chart" uri="{CE6537A1-D6FC-4f65-9D91-7224C49458BB}"/>
+            </c:extLst>
           </c:dLbls>
           <c:cat>
             <c:strRef>
@@ -167,6 +342,11 @@
               </c:numCache>
             </c:numRef>
           </c:val>
+          <c:extLst>
+            <c:ext xmlns:c16="http://schemas.microsoft.com/office/drawing/2014/chart" uri="{C3380CC4-5D6E-409C-BE32-E72D297353CC}">
+              <c16:uniqueId val="{00000004-81CE-4DAF-A6CC-02AA206FE0A7}"/>
+            </c:ext>
+          </c:extLst>
         </c:ser>
         <c:ser>
           <c:idx val="1"/>
@@ -184,44 +364,56 @@
           </c:tx>
           <c:spPr>
             <a:solidFill>
-              <a:srgbClr val="facf6f"/>
+              <a:srgbClr val="FACF6F"/>
             </a:solidFill>
             <a:ln w="0">
               <a:noFill/>
             </a:ln>
           </c:spPr>
-          <c:explosion val="0"/>
           <c:dPt>
             <c:idx val="0"/>
+            <c:bubble3D val="0"/>
             <c:spPr>
               <a:solidFill>
-                <a:srgbClr val="facf6f"/>
+                <a:srgbClr val="FACF6F"/>
               </a:solidFill>
               <a:ln w="0">
                 <a:noFill/>
               </a:ln>
             </c:spPr>
+            <c:extLst>
+              <c:ext xmlns:c16="http://schemas.microsoft.com/office/drawing/2014/chart" uri="{C3380CC4-5D6E-409C-BE32-E72D297353CC}">
+                <c16:uniqueId val="{00000006-81CE-4DAF-A6CC-02AA206FE0A7}"/>
+              </c:ext>
+            </c:extLst>
           </c:dPt>
           <c:dPt>
             <c:idx val="1"/>
+            <c:bubble3D val="0"/>
             <c:spPr>
               <a:solidFill>
-                <a:srgbClr val="f0ad4e"/>
+                <a:srgbClr val="F0AD4E"/>
               </a:solidFill>
               <a:ln w="0">
                 <a:noFill/>
               </a:ln>
             </c:spPr>
+            <c:extLst>
+              <c:ext xmlns:c16="http://schemas.microsoft.com/office/drawing/2014/chart" uri="{C3380CC4-5D6E-409C-BE32-E72D297353CC}">
+                <c16:uniqueId val="{00000008-81CE-4DAF-A6CC-02AA206FE0A7}"/>
+              </c:ext>
+            </c:extLst>
           </c:dPt>
           <c:dLbls>
             <c:dLbl>
               <c:idx val="0"/>
+              <c:spPr/>
               <c:txPr>
                 <a:bodyPr wrap="square"/>
                 <a:lstStyle/>
                 <a:p>
                   <a:pPr>
-                    <a:defRPr b="0" sz="1000" spc="-1" strike="noStrike">
+                    <a:defRPr sz="1000" b="0" strike="noStrike" spc="-1">
                       <a:solidFill>
                         <a:srgbClr val="000000"/>
                       </a:solidFill>
@@ -229,6 +421,7 @@
                       <a:ea typeface="DejaVu Sans"/>
                     </a:defRPr>
                   </a:pPr>
+                  <a:endParaRPr lang="en-US"/>
                 </a:p>
               </c:txPr>
               <c:showLegendKey val="0"/>
@@ -236,16 +429,23 @@
               <c:showCatName val="0"/>
               <c:showSerName val="0"/>
               <c:showPercent val="0"/>
-              <c:separator> </c:separator>
+              <c:showBubbleSize val="1"/>
+              <c:extLst>
+                <c:ext xmlns:c15="http://schemas.microsoft.com/office/drawing/2012/chart" uri="{CE6537A1-D6FC-4f65-9D91-7224C49458BB}"/>
+                <c:ext xmlns:c16="http://schemas.microsoft.com/office/drawing/2014/chart" uri="{C3380CC4-5D6E-409C-BE32-E72D297353CC}">
+                  <c16:uniqueId val="{00000006-81CE-4DAF-A6CC-02AA206FE0A7}"/>
+                </c:ext>
+              </c:extLst>
             </c:dLbl>
             <c:dLbl>
               <c:idx val="1"/>
+              <c:spPr/>
               <c:txPr>
                 <a:bodyPr wrap="square"/>
                 <a:lstStyle/>
                 <a:p>
                   <a:pPr>
-                    <a:defRPr b="0" sz="1000" spc="-1" strike="noStrike">
+                    <a:defRPr sz="1000" b="0" strike="noStrike" spc="-1">
                       <a:solidFill>
                         <a:srgbClr val="000000"/>
                       </a:solidFill>
@@ -253,6 +453,7 @@
                       <a:ea typeface="DejaVu Sans"/>
                     </a:defRPr>
                   </a:pPr>
+                  <a:endParaRPr lang="en-US"/>
                 </a:p>
               </c:txPr>
               <c:showLegendKey val="0"/>
@@ -260,14 +461,27 @@
               <c:showCatName val="0"/>
               <c:showSerName val="0"/>
               <c:showPercent val="0"/>
-              <c:separator> </c:separator>
+              <c:showBubbleSize val="1"/>
+              <c:extLst>
+                <c:ext xmlns:c15="http://schemas.microsoft.com/office/drawing/2012/chart" uri="{CE6537A1-D6FC-4f65-9D91-7224C49458BB}"/>
+                <c:ext xmlns:c16="http://schemas.microsoft.com/office/drawing/2014/chart" uri="{C3380CC4-5D6E-409C-BE32-E72D297353CC}">
+                  <c16:uniqueId val="{00000008-81CE-4DAF-A6CC-02AA206FE0A7}"/>
+                </c:ext>
+              </c:extLst>
             </c:dLbl>
+            <c:spPr>
+              <a:noFill/>
+              <a:ln>
+                <a:noFill/>
+              </a:ln>
+              <a:effectLst/>
+            </c:spPr>
             <c:txPr>
               <a:bodyPr wrap="square"/>
               <a:lstStyle/>
               <a:p>
                 <a:pPr>
-                  <a:defRPr b="0" sz="1000" spc="-1" strike="noStrike">
+                  <a:defRPr sz="1000" b="0" strike="noStrike" spc="-1">
                     <a:solidFill>
                       <a:srgbClr val="000000"/>
                     </a:solidFill>
@@ -275,6 +489,7 @@
                     <a:ea typeface="DejaVu Sans"/>
                   </a:defRPr>
                 </a:pPr>
+                <a:endParaRPr lang="en-US"/>
               </a:p>
             </c:txPr>
             <c:showLegendKey val="0"/>
@@ -282,8 +497,12 @@
             <c:showCatName val="0"/>
             <c:showSerName val="0"/>
             <c:showPercent val="0"/>
+            <c:showBubbleSize val="1"/>
             <c:separator> </c:separator>
             <c:showLeaderLines val="0"/>
+            <c:extLst>
+              <c:ext xmlns:c15="http://schemas.microsoft.com/office/drawing/2012/chart" uri="{CE6537A1-D6FC-4f65-9D91-7224C49458BB}"/>
+            </c:extLst>
           </c:dLbls>
           <c:cat>
             <c:strRef>
@@ -309,12 +528,26 @@
                   <c:v>3.2</c:v>
                 </c:pt>
                 <c:pt idx="1">
-                  <c:v>8.8</c:v>
+                  <c:v>8.8000000000000007</c:v>
                 </c:pt>
               </c:numCache>
             </c:numRef>
           </c:val>
+          <c:extLst>
+            <c:ext xmlns:c16="http://schemas.microsoft.com/office/drawing/2014/chart" uri="{C3380CC4-5D6E-409C-BE32-E72D297353CC}">
+              <c16:uniqueId val="{00000009-81CE-4DAF-A6CC-02AA206FE0A7}"/>
+            </c:ext>
+          </c:extLst>
         </c:ser>
+        <c:dLbls>
+          <c:showLegendKey val="0"/>
+          <c:showVal val="0"/>
+          <c:showCatName val="0"/>
+          <c:showSerName val="0"/>
+          <c:showPercent val="0"/>
+          <c:showBubbleSize val="0"/>
+          <c:showLeaderLines val="0"/>
+        </c:dLbls>
         <c:firstSliceAng val="0"/>
         <c:holeSize val="50"/>
       </c:doughnutChart>
@@ -322,7 +555,7 @@
         <a:noFill/>
         <a:ln w="0">
           <a:solidFill>
-            <a:srgbClr val="b3b3b3"/>
+            <a:srgbClr val="B3B3B3"/>
           </a:solidFill>
         </a:ln>
       </c:spPr>
@@ -341,7 +574,7 @@
         <a:lstStyle/>
         <a:p>
           <a:pPr>
-            <a:defRPr b="0" sz="1000" spc="-1" strike="noStrike">
+            <a:defRPr sz="1000" b="0" strike="noStrike" spc="-1">
               <a:solidFill>
                 <a:srgbClr val="000000"/>
               </a:solidFill>
@@ -349,11 +582,13 @@
               <a:ea typeface="DejaVu Sans"/>
             </a:defRPr>
           </a:pPr>
+          <a:endParaRPr lang="en-US"/>
         </a:p>
       </c:txPr>
     </c:legend>
     <c:plotVisOnly val="1"/>
     <c:dispBlanksAs val="zero"/>
+    <c:showDLblsOverMax val="1"/>
   </c:chart>
   <c:spPr>
     <a:noFill/>
@@ -365,7 +600,7 @@
 </file>
 
 <file path=ppt/slideLayouts/slideLayout1.xml><?xml version="1.0" encoding="utf-8"?>
-<p:sldLayout xmlns:a="http://schemas.openxmlformats.org/drawingml/2006/main" xmlns:p="http://schemas.openxmlformats.org/presentationml/2006/main" xmlns:r="http://schemas.openxmlformats.org/officeDocument/2006/relationships" xmlns:p14="http://schemas.microsoft.com/office/powerpoint/2010/main" xmlns:p15="http://schemas.microsoft.com/office/powerpoint/2012/main" xmlns:mc="http://schemas.openxmlformats.org/markup-compatibility/2006" type="blank" preserve="1">
+<p:sldLayout xmlns:a="http://schemas.openxmlformats.org/drawingml/2006/main" xmlns:r="http://schemas.openxmlformats.org/officeDocument/2006/relationships" xmlns:p="http://schemas.openxmlformats.org/presentationml/2006/main" type="blank" preserve="1">
   <p:cSld name="Blank Slide">
     <p:spTree>
       <p:nvGrpSpPr>
@@ -383,11 +618,14 @@
       </p:grpSpPr>
     </p:spTree>
   </p:cSld>
+  <p:clrMapOvr>
+    <a:masterClrMapping/>
+  </p:clrMapOvr>
 </p:sldLayout>
 </file>
 
 <file path=ppt/slideLayouts/slideLayout10.xml><?xml version="1.0" encoding="utf-8"?>
-<p:sldLayout xmlns:a="http://schemas.openxmlformats.org/drawingml/2006/main" xmlns:p="http://schemas.openxmlformats.org/presentationml/2006/main" xmlns:r="http://schemas.openxmlformats.org/officeDocument/2006/relationships" xmlns:p14="http://schemas.microsoft.com/office/powerpoint/2010/main" xmlns:p15="http://schemas.microsoft.com/office/powerpoint/2012/main" xmlns:mc="http://schemas.openxmlformats.org/markup-compatibility/2006" type="objOverTx" preserve="1">
+<p:sldLayout xmlns:a="http://schemas.openxmlformats.org/drawingml/2006/main" xmlns:r="http://schemas.openxmlformats.org/officeDocument/2006/relationships" xmlns:p="http://schemas.openxmlformats.org/presentationml/2006/main" type="objOverTx" preserve="1">
   <p:cSld name="Title, Content over Content">
     <p:spTree>
       <p:nvGrpSpPr>
@@ -427,14 +665,15 @@
           </a:ln>
         </p:spPr>
         <p:txBody>
-          <a:bodyPr lIns="0" rIns="0" tIns="0" bIns="0" anchor="ctr">
+          <a:bodyPr lIns="0" tIns="0" rIns="0" bIns="0" anchor="ctr">
             <a:noAutofit/>
           </a:bodyPr>
+          <a:lstStyle/>
           <a:p>
             <a:pPr algn="ctr">
               <a:buNone/>
             </a:pPr>
-            <a:endParaRPr b="0" lang="en-US" sz="4400" spc="-1" strike="noStrike">
+            <a:endParaRPr lang="en-US" sz="4400" b="0" strike="noStrike" spc="-1">
               <a:latin typeface="Arial"/>
             </a:endParaRPr>
           </a:p>
@@ -464,11 +703,12 @@
           </a:ln>
         </p:spPr>
         <p:txBody>
-          <a:bodyPr lIns="0" rIns="0" tIns="0" bIns="0" anchor="t">
+          <a:bodyPr lIns="0" tIns="0" rIns="0" bIns="0" anchor="t">
             <a:normAutofit/>
           </a:bodyPr>
-          <a:p>
-            <a:endParaRPr b="0" lang="en-US" sz="3200" spc="-1" strike="noStrike">
+          <a:lstStyle/>
+          <a:p>
+            <a:endParaRPr lang="en-US" sz="3200" b="0" strike="noStrike" spc="-1">
               <a:latin typeface="Arial"/>
             </a:endParaRPr>
           </a:p>
@@ -498,11 +738,12 @@
           </a:ln>
         </p:spPr>
         <p:txBody>
-          <a:bodyPr lIns="0" rIns="0" tIns="0" bIns="0" anchor="t">
+          <a:bodyPr lIns="0" tIns="0" rIns="0" bIns="0" anchor="t">
             <a:normAutofit/>
           </a:bodyPr>
-          <a:p>
-            <a:endParaRPr b="0" lang="en-US" sz="3200" spc="-1" strike="noStrike">
+          <a:lstStyle/>
+          <a:p>
+            <a:endParaRPr lang="en-US" sz="3200" b="0" strike="noStrike" spc="-1">
               <a:latin typeface="Arial"/>
             </a:endParaRPr>
           </a:p>
@@ -510,11 +751,14 @@
       </p:sp>
     </p:spTree>
   </p:cSld>
+  <p:clrMapOvr>
+    <a:masterClrMapping/>
+  </p:clrMapOvr>
 </p:sldLayout>
 </file>
 
 <file path=ppt/slideLayouts/slideLayout11.xml><?xml version="1.0" encoding="utf-8"?>
-<p:sldLayout xmlns:a="http://schemas.openxmlformats.org/drawingml/2006/main" xmlns:p="http://schemas.openxmlformats.org/presentationml/2006/main" xmlns:r="http://schemas.openxmlformats.org/officeDocument/2006/relationships" xmlns:p14="http://schemas.microsoft.com/office/powerpoint/2010/main" xmlns:p15="http://schemas.microsoft.com/office/powerpoint/2012/main" xmlns:mc="http://schemas.openxmlformats.org/markup-compatibility/2006" type="fourObj" preserve="1">
+<p:sldLayout xmlns:a="http://schemas.openxmlformats.org/drawingml/2006/main" xmlns:r="http://schemas.openxmlformats.org/officeDocument/2006/relationships" xmlns:p="http://schemas.openxmlformats.org/presentationml/2006/main" type="fourObj" preserve="1">
   <p:cSld name="Title, 4 Content">
     <p:spTree>
       <p:nvGrpSpPr>
@@ -554,14 +798,15 @@
           </a:ln>
         </p:spPr>
         <p:txBody>
-          <a:bodyPr lIns="0" rIns="0" tIns="0" bIns="0" anchor="ctr">
+          <a:bodyPr lIns="0" tIns="0" rIns="0" bIns="0" anchor="ctr">
             <a:noAutofit/>
           </a:bodyPr>
+          <a:lstStyle/>
           <a:p>
             <a:pPr algn="ctr">
               <a:buNone/>
             </a:pPr>
-            <a:endParaRPr b="0" lang="en-US" sz="4400" spc="-1" strike="noStrike">
+            <a:endParaRPr lang="en-US" sz="4400" b="0" strike="noStrike" spc="-1">
               <a:latin typeface="Arial"/>
             </a:endParaRPr>
           </a:p>
@@ -591,11 +836,12 @@
           </a:ln>
         </p:spPr>
         <p:txBody>
-          <a:bodyPr lIns="0" rIns="0" tIns="0" bIns="0" anchor="t">
+          <a:bodyPr lIns="0" tIns="0" rIns="0" bIns="0" anchor="t">
             <a:normAutofit/>
           </a:bodyPr>
-          <a:p>
-            <a:endParaRPr b="0" lang="en-US" sz="3200" spc="-1" strike="noStrike">
+          <a:lstStyle/>
+          <a:p>
+            <a:endParaRPr lang="en-US" sz="3200" b="0" strike="noStrike" spc="-1">
               <a:latin typeface="Arial"/>
             </a:endParaRPr>
           </a:p>
@@ -625,11 +871,12 @@
           </a:ln>
         </p:spPr>
         <p:txBody>
-          <a:bodyPr lIns="0" rIns="0" tIns="0" bIns="0" anchor="t">
+          <a:bodyPr lIns="0" tIns="0" rIns="0" bIns="0" anchor="t">
             <a:normAutofit/>
           </a:bodyPr>
-          <a:p>
-            <a:endParaRPr b="0" lang="en-US" sz="3200" spc="-1" strike="noStrike">
+          <a:lstStyle/>
+          <a:p>
+            <a:endParaRPr lang="en-US" sz="3200" b="0" strike="noStrike" spc="-1">
               <a:latin typeface="Arial"/>
             </a:endParaRPr>
           </a:p>
@@ -659,11 +906,12 @@
           </a:ln>
         </p:spPr>
         <p:txBody>
-          <a:bodyPr lIns="0" rIns="0" tIns="0" bIns="0" anchor="t">
+          <a:bodyPr lIns="0" tIns="0" rIns="0" bIns="0" anchor="t">
             <a:normAutofit/>
           </a:bodyPr>
-          <a:p>
-            <a:endParaRPr b="0" lang="en-US" sz="3200" spc="-1" strike="noStrike">
+          <a:lstStyle/>
+          <a:p>
+            <a:endParaRPr lang="en-US" sz="3200" b="0" strike="noStrike" spc="-1">
               <a:latin typeface="Arial"/>
             </a:endParaRPr>
           </a:p>
@@ -693,11 +941,12 @@
           </a:ln>
         </p:spPr>
         <p:txBody>
-          <a:bodyPr lIns="0" rIns="0" tIns="0" bIns="0" anchor="t">
+          <a:bodyPr lIns="0" tIns="0" rIns="0" bIns="0" anchor="t">
             <a:normAutofit/>
           </a:bodyPr>
-          <a:p>
-            <a:endParaRPr b="0" lang="en-US" sz="3200" spc="-1" strike="noStrike">
+          <a:lstStyle/>
+          <a:p>
+            <a:endParaRPr lang="en-US" sz="3200" b="0" strike="noStrike" spc="-1">
               <a:latin typeface="Arial"/>
             </a:endParaRPr>
           </a:p>
@@ -705,11 +954,14 @@
       </p:sp>
     </p:spTree>
   </p:cSld>
+  <p:clrMapOvr>
+    <a:masterClrMapping/>
+  </p:clrMapOvr>
 </p:sldLayout>
 </file>
 
 <file path=ppt/slideLayouts/slideLayout12.xml><?xml version="1.0" encoding="utf-8"?>
-<p:sldLayout xmlns:a="http://schemas.openxmlformats.org/drawingml/2006/main" xmlns:p="http://schemas.openxmlformats.org/presentationml/2006/main" xmlns:r="http://schemas.openxmlformats.org/officeDocument/2006/relationships" xmlns:p14="http://schemas.microsoft.com/office/powerpoint/2010/main" xmlns:p15="http://schemas.microsoft.com/office/powerpoint/2012/main" xmlns:mc="http://schemas.openxmlformats.org/markup-compatibility/2006" type="blank" preserve="1">
+<p:sldLayout xmlns:a="http://schemas.openxmlformats.org/drawingml/2006/main" xmlns:r="http://schemas.openxmlformats.org/officeDocument/2006/relationships" xmlns:p="http://schemas.openxmlformats.org/presentationml/2006/main" type="blank" preserve="1">
   <p:cSld name="Title, 6 Content">
     <p:spTree>
       <p:nvGrpSpPr>
@@ -749,14 +1001,15 @@
           </a:ln>
         </p:spPr>
         <p:txBody>
-          <a:bodyPr lIns="0" rIns="0" tIns="0" bIns="0" anchor="ctr">
+          <a:bodyPr lIns="0" tIns="0" rIns="0" bIns="0" anchor="ctr">
             <a:noAutofit/>
           </a:bodyPr>
+          <a:lstStyle/>
           <a:p>
             <a:pPr algn="ctr">
               <a:buNone/>
             </a:pPr>
-            <a:endParaRPr b="0" lang="en-US" sz="4400" spc="-1" strike="noStrike">
+            <a:endParaRPr lang="en-US" sz="4400" b="0" strike="noStrike" spc="-1">
               <a:latin typeface="Arial"/>
             </a:endParaRPr>
           </a:p>
@@ -786,11 +1039,12 @@
           </a:ln>
         </p:spPr>
         <p:txBody>
-          <a:bodyPr lIns="0" rIns="0" tIns="0" bIns="0" anchor="t">
+          <a:bodyPr lIns="0" tIns="0" rIns="0" bIns="0" anchor="t">
             <a:normAutofit/>
           </a:bodyPr>
-          <a:p>
-            <a:endParaRPr b="0" lang="en-US" sz="3200" spc="-1" strike="noStrike">
+          <a:lstStyle/>
+          <a:p>
+            <a:endParaRPr lang="en-US" sz="3200" b="0" strike="noStrike" spc="-1">
               <a:latin typeface="Arial"/>
             </a:endParaRPr>
           </a:p>
@@ -820,11 +1074,12 @@
           </a:ln>
         </p:spPr>
         <p:txBody>
-          <a:bodyPr lIns="0" rIns="0" tIns="0" bIns="0" anchor="t">
+          <a:bodyPr lIns="0" tIns="0" rIns="0" bIns="0" anchor="t">
             <a:normAutofit/>
           </a:bodyPr>
-          <a:p>
-            <a:endParaRPr b="0" lang="en-US" sz="3200" spc="-1" strike="noStrike">
+          <a:lstStyle/>
+          <a:p>
+            <a:endParaRPr lang="en-US" sz="3200" b="0" strike="noStrike" spc="-1">
               <a:latin typeface="Arial"/>
             </a:endParaRPr>
           </a:p>
@@ -854,11 +1109,12 @@
           </a:ln>
         </p:spPr>
         <p:txBody>
-          <a:bodyPr lIns="0" rIns="0" tIns="0" bIns="0" anchor="t">
+          <a:bodyPr lIns="0" tIns="0" rIns="0" bIns="0" anchor="t">
             <a:normAutofit/>
           </a:bodyPr>
-          <a:p>
-            <a:endParaRPr b="0" lang="en-US" sz="3200" spc="-1" strike="noStrike">
+          <a:lstStyle/>
+          <a:p>
+            <a:endParaRPr lang="en-US" sz="3200" b="0" strike="noStrike" spc="-1">
               <a:latin typeface="Arial"/>
             </a:endParaRPr>
           </a:p>
@@ -888,11 +1144,12 @@
           </a:ln>
         </p:spPr>
         <p:txBody>
-          <a:bodyPr lIns="0" rIns="0" tIns="0" bIns="0" anchor="t">
+          <a:bodyPr lIns="0" tIns="0" rIns="0" bIns="0" anchor="t">
             <a:normAutofit/>
           </a:bodyPr>
-          <a:p>
-            <a:endParaRPr b="0" lang="en-US" sz="3200" spc="-1" strike="noStrike">
+          <a:lstStyle/>
+          <a:p>
+            <a:endParaRPr lang="en-US" sz="3200" b="0" strike="noStrike" spc="-1">
               <a:latin typeface="Arial"/>
             </a:endParaRPr>
           </a:p>
@@ -922,11 +1179,12 @@
           </a:ln>
         </p:spPr>
         <p:txBody>
-          <a:bodyPr lIns="0" rIns="0" tIns="0" bIns="0" anchor="t">
+          <a:bodyPr lIns="0" tIns="0" rIns="0" bIns="0" anchor="t">
             <a:normAutofit/>
           </a:bodyPr>
-          <a:p>
-            <a:endParaRPr b="0" lang="en-US" sz="3200" spc="-1" strike="noStrike">
+          <a:lstStyle/>
+          <a:p>
+            <a:endParaRPr lang="en-US" sz="3200" b="0" strike="noStrike" spc="-1">
               <a:latin typeface="Arial"/>
             </a:endParaRPr>
           </a:p>
@@ -956,11 +1214,12 @@
           </a:ln>
         </p:spPr>
         <p:txBody>
-          <a:bodyPr lIns="0" rIns="0" tIns="0" bIns="0" anchor="t">
+          <a:bodyPr lIns="0" tIns="0" rIns="0" bIns="0" anchor="t">
             <a:normAutofit/>
           </a:bodyPr>
-          <a:p>
-            <a:endParaRPr b="0" lang="en-US" sz="3200" spc="-1" strike="noStrike">
+          <a:lstStyle/>
+          <a:p>
+            <a:endParaRPr lang="en-US" sz="3200" b="0" strike="noStrike" spc="-1">
               <a:latin typeface="Arial"/>
             </a:endParaRPr>
           </a:p>
@@ -968,11 +1227,14 @@
       </p:sp>
     </p:spTree>
   </p:cSld>
+  <p:clrMapOvr>
+    <a:masterClrMapping/>
+  </p:clrMapOvr>
 </p:sldLayout>
 </file>
 
 <file path=ppt/slideLayouts/slideLayout2.xml><?xml version="1.0" encoding="utf-8"?>
-<p:sldLayout xmlns:a="http://schemas.openxmlformats.org/drawingml/2006/main" xmlns:p="http://schemas.openxmlformats.org/presentationml/2006/main" xmlns:r="http://schemas.openxmlformats.org/officeDocument/2006/relationships" xmlns:p14="http://schemas.microsoft.com/office/powerpoint/2010/main" xmlns:p15="http://schemas.microsoft.com/office/powerpoint/2012/main" xmlns:mc="http://schemas.openxmlformats.org/markup-compatibility/2006" type="tx" preserve="1">
+<p:sldLayout xmlns:a="http://schemas.openxmlformats.org/drawingml/2006/main" xmlns:r="http://schemas.openxmlformats.org/officeDocument/2006/relationships" xmlns:p="http://schemas.openxmlformats.org/presentationml/2006/main" type="tx" preserve="1">
   <p:cSld name="Title Slide">
     <p:spTree>
       <p:nvGrpSpPr>
@@ -1012,14 +1274,15 @@
           </a:ln>
         </p:spPr>
         <p:txBody>
-          <a:bodyPr lIns="0" rIns="0" tIns="0" bIns="0" anchor="ctr">
+          <a:bodyPr lIns="0" tIns="0" rIns="0" bIns="0" anchor="ctr">
             <a:noAutofit/>
           </a:bodyPr>
+          <a:lstStyle/>
           <a:p>
             <a:pPr algn="ctr">
               <a:buNone/>
             </a:pPr>
-            <a:endParaRPr b="0" lang="en-US" sz="4400" spc="-1" strike="noStrike">
+            <a:endParaRPr lang="en-US" sz="4400" b="0" strike="noStrike" spc="-1">
               <a:latin typeface="Arial"/>
             </a:endParaRPr>
           </a:p>
@@ -1049,14 +1312,15 @@
           </a:ln>
         </p:spPr>
         <p:txBody>
-          <a:bodyPr lIns="0" rIns="0" tIns="0" bIns="0" anchor="ctr">
+          <a:bodyPr lIns="0" tIns="0" rIns="0" bIns="0" anchor="ctr">
             <a:noAutofit/>
           </a:bodyPr>
+          <a:lstStyle/>
           <a:p>
             <a:pPr algn="ctr">
               <a:buNone/>
             </a:pPr>
-            <a:endParaRPr b="0" lang="en-US" sz="3200" spc="-1" strike="noStrike">
+            <a:endParaRPr lang="en-US" sz="3200" b="0" strike="noStrike" spc="-1">
               <a:latin typeface="Arial"/>
             </a:endParaRPr>
           </a:p>
@@ -1064,11 +1328,14 @@
       </p:sp>
     </p:spTree>
   </p:cSld>
+  <p:clrMapOvr>
+    <a:masterClrMapping/>
+  </p:clrMapOvr>
 </p:sldLayout>
 </file>
 
 <file path=ppt/slideLayouts/slideLayout3.xml><?xml version="1.0" encoding="utf-8"?>
-<p:sldLayout xmlns:a="http://schemas.openxmlformats.org/drawingml/2006/main" xmlns:p="http://schemas.openxmlformats.org/presentationml/2006/main" xmlns:r="http://schemas.openxmlformats.org/officeDocument/2006/relationships" xmlns:p14="http://schemas.microsoft.com/office/powerpoint/2010/main" xmlns:p15="http://schemas.microsoft.com/office/powerpoint/2012/main" xmlns:mc="http://schemas.openxmlformats.org/markup-compatibility/2006" type="obj" preserve="1">
+<p:sldLayout xmlns:a="http://schemas.openxmlformats.org/drawingml/2006/main" xmlns:r="http://schemas.openxmlformats.org/officeDocument/2006/relationships" xmlns:p="http://schemas.openxmlformats.org/presentationml/2006/main" type="obj" preserve="1">
   <p:cSld name="Title, Content">
     <p:spTree>
       <p:nvGrpSpPr>
@@ -1108,14 +1375,15 @@
           </a:ln>
         </p:spPr>
         <p:txBody>
-          <a:bodyPr lIns="0" rIns="0" tIns="0" bIns="0" anchor="ctr">
+          <a:bodyPr lIns="0" tIns="0" rIns="0" bIns="0" anchor="ctr">
             <a:noAutofit/>
           </a:bodyPr>
+          <a:lstStyle/>
           <a:p>
             <a:pPr algn="ctr">
               <a:buNone/>
             </a:pPr>
-            <a:endParaRPr b="0" lang="en-US" sz="4400" spc="-1" strike="noStrike">
+            <a:endParaRPr lang="en-US" sz="4400" b="0" strike="noStrike" spc="-1">
               <a:latin typeface="Arial"/>
             </a:endParaRPr>
           </a:p>
@@ -1145,11 +1413,12 @@
           </a:ln>
         </p:spPr>
         <p:txBody>
-          <a:bodyPr lIns="0" rIns="0" tIns="0" bIns="0" anchor="t">
+          <a:bodyPr lIns="0" tIns="0" rIns="0" bIns="0" anchor="t">
             <a:normAutofit/>
           </a:bodyPr>
-          <a:p>
-            <a:endParaRPr b="0" lang="en-US" sz="3200" spc="-1" strike="noStrike">
+          <a:lstStyle/>
+          <a:p>
+            <a:endParaRPr lang="en-US" sz="3200" b="0" strike="noStrike" spc="-1">
               <a:latin typeface="Arial"/>
             </a:endParaRPr>
           </a:p>
@@ -1157,11 +1426,14 @@
       </p:sp>
     </p:spTree>
   </p:cSld>
+  <p:clrMapOvr>
+    <a:masterClrMapping/>
+  </p:clrMapOvr>
 </p:sldLayout>
 </file>
 
 <file path=ppt/slideLayouts/slideLayout4.xml><?xml version="1.0" encoding="utf-8"?>
-<p:sldLayout xmlns:a="http://schemas.openxmlformats.org/drawingml/2006/main" xmlns:p="http://schemas.openxmlformats.org/presentationml/2006/main" xmlns:r="http://schemas.openxmlformats.org/officeDocument/2006/relationships" xmlns:p14="http://schemas.microsoft.com/office/powerpoint/2010/main" xmlns:p15="http://schemas.microsoft.com/office/powerpoint/2012/main" xmlns:mc="http://schemas.openxmlformats.org/markup-compatibility/2006" type="twoObj" preserve="1">
+<p:sldLayout xmlns:a="http://schemas.openxmlformats.org/drawingml/2006/main" xmlns:r="http://schemas.openxmlformats.org/officeDocument/2006/relationships" xmlns:p="http://schemas.openxmlformats.org/presentationml/2006/main" type="twoObj" preserve="1">
   <p:cSld name="Title, 2 Content">
     <p:spTree>
       <p:nvGrpSpPr>
@@ -1201,14 +1473,15 @@
           </a:ln>
         </p:spPr>
         <p:txBody>
-          <a:bodyPr lIns="0" rIns="0" tIns="0" bIns="0" anchor="ctr">
+          <a:bodyPr lIns="0" tIns="0" rIns="0" bIns="0" anchor="ctr">
             <a:noAutofit/>
           </a:bodyPr>
+          <a:lstStyle/>
           <a:p>
             <a:pPr algn="ctr">
               <a:buNone/>
             </a:pPr>
-            <a:endParaRPr b="0" lang="en-US" sz="4400" spc="-1" strike="noStrike">
+            <a:endParaRPr lang="en-US" sz="4400" b="0" strike="noStrike" spc="-1">
               <a:latin typeface="Arial"/>
             </a:endParaRPr>
           </a:p>
@@ -1238,11 +1511,12 @@
           </a:ln>
         </p:spPr>
         <p:txBody>
-          <a:bodyPr lIns="0" rIns="0" tIns="0" bIns="0" anchor="t">
+          <a:bodyPr lIns="0" tIns="0" rIns="0" bIns="0" anchor="t">
             <a:normAutofit/>
           </a:bodyPr>
-          <a:p>
-            <a:endParaRPr b="0" lang="en-US" sz="3200" spc="-1" strike="noStrike">
+          <a:lstStyle/>
+          <a:p>
+            <a:endParaRPr lang="en-US" sz="3200" b="0" strike="noStrike" spc="-1">
               <a:latin typeface="Arial"/>
             </a:endParaRPr>
           </a:p>
@@ -1272,11 +1546,12 @@
           </a:ln>
         </p:spPr>
         <p:txBody>
-          <a:bodyPr lIns="0" rIns="0" tIns="0" bIns="0" anchor="t">
+          <a:bodyPr lIns="0" tIns="0" rIns="0" bIns="0" anchor="t">
             <a:normAutofit/>
           </a:bodyPr>
-          <a:p>
-            <a:endParaRPr b="0" lang="en-US" sz="3200" spc="-1" strike="noStrike">
+          <a:lstStyle/>
+          <a:p>
+            <a:endParaRPr lang="en-US" sz="3200" b="0" strike="noStrike" spc="-1">
               <a:latin typeface="Arial"/>
             </a:endParaRPr>
           </a:p>
@@ -1284,11 +1559,14 @@
       </p:sp>
     </p:spTree>
   </p:cSld>
+  <p:clrMapOvr>
+    <a:masterClrMapping/>
+  </p:clrMapOvr>
 </p:sldLayout>
 </file>
 
 <file path=ppt/slideLayouts/slideLayout5.xml><?xml version="1.0" encoding="utf-8"?>
-<p:sldLayout xmlns:a="http://schemas.openxmlformats.org/drawingml/2006/main" xmlns:p="http://schemas.openxmlformats.org/presentationml/2006/main" xmlns:r="http://schemas.openxmlformats.org/officeDocument/2006/relationships" xmlns:p14="http://schemas.microsoft.com/office/powerpoint/2010/main" xmlns:p15="http://schemas.microsoft.com/office/powerpoint/2012/main" xmlns:mc="http://schemas.openxmlformats.org/markup-compatibility/2006" type="titleOnly" preserve="1">
+<p:sldLayout xmlns:a="http://schemas.openxmlformats.org/drawingml/2006/main" xmlns:r="http://schemas.openxmlformats.org/officeDocument/2006/relationships" xmlns:p="http://schemas.openxmlformats.org/presentationml/2006/main" type="titleOnly" preserve="1">
   <p:cSld name="Title Only">
     <p:spTree>
       <p:nvGrpSpPr>
@@ -1328,14 +1606,15 @@
           </a:ln>
         </p:spPr>
         <p:txBody>
-          <a:bodyPr lIns="0" rIns="0" tIns="0" bIns="0" anchor="ctr">
+          <a:bodyPr lIns="0" tIns="0" rIns="0" bIns="0" anchor="ctr">
             <a:noAutofit/>
           </a:bodyPr>
+          <a:lstStyle/>
           <a:p>
             <a:pPr algn="ctr">
               <a:buNone/>
             </a:pPr>
-            <a:endParaRPr b="0" lang="en-US" sz="4400" spc="-1" strike="noStrike">
+            <a:endParaRPr lang="en-US" sz="4400" b="0" strike="noStrike" spc="-1">
               <a:latin typeface="Arial"/>
             </a:endParaRPr>
           </a:p>
@@ -1343,11 +1622,14 @@
       </p:sp>
     </p:spTree>
   </p:cSld>
+  <p:clrMapOvr>
+    <a:masterClrMapping/>
+  </p:clrMapOvr>
 </p:sldLayout>
 </file>
 
 <file path=ppt/slideLayouts/slideLayout6.xml><?xml version="1.0" encoding="utf-8"?>
-<p:sldLayout xmlns:a="http://schemas.openxmlformats.org/drawingml/2006/main" xmlns:p="http://schemas.openxmlformats.org/presentationml/2006/main" xmlns:r="http://schemas.openxmlformats.org/officeDocument/2006/relationships" xmlns:p14="http://schemas.microsoft.com/office/powerpoint/2010/main" xmlns:p15="http://schemas.microsoft.com/office/powerpoint/2012/main" xmlns:mc="http://schemas.openxmlformats.org/markup-compatibility/2006" type="objOnly" preserve="1">
+<p:sldLayout xmlns:a="http://schemas.openxmlformats.org/drawingml/2006/main" xmlns:r="http://schemas.openxmlformats.org/officeDocument/2006/relationships" xmlns:p="http://schemas.openxmlformats.org/presentationml/2006/main" type="objOnly" preserve="1">
   <p:cSld name="Centered Text">
     <p:spTree>
       <p:nvGrpSpPr>
@@ -1387,14 +1669,15 @@
           </a:ln>
         </p:spPr>
         <p:txBody>
-          <a:bodyPr lIns="0" rIns="0" tIns="0" bIns="0" anchor="ctr">
+          <a:bodyPr lIns="0" tIns="0" rIns="0" bIns="0" anchor="ctr">
             <a:noAutofit/>
           </a:bodyPr>
+          <a:lstStyle/>
           <a:p>
             <a:pPr algn="ctr">
               <a:buNone/>
             </a:pPr>
-            <a:endParaRPr b="0" lang="en-US" sz="3200" spc="-1" strike="noStrike">
+            <a:endParaRPr lang="en-US" sz="3200" b="0" strike="noStrike" spc="-1">
               <a:latin typeface="Arial"/>
             </a:endParaRPr>
           </a:p>
@@ -1402,11 +1685,14 @@
       </p:sp>
     </p:spTree>
   </p:cSld>
+  <p:clrMapOvr>
+    <a:masterClrMapping/>
+  </p:clrMapOvr>
 </p:sldLayout>
 </file>
 
 <file path=ppt/slideLayouts/slideLayout7.xml><?xml version="1.0" encoding="utf-8"?>
-<p:sldLayout xmlns:a="http://schemas.openxmlformats.org/drawingml/2006/main" xmlns:p="http://schemas.openxmlformats.org/presentationml/2006/main" xmlns:r="http://schemas.openxmlformats.org/officeDocument/2006/relationships" xmlns:p14="http://schemas.microsoft.com/office/powerpoint/2010/main" xmlns:p15="http://schemas.microsoft.com/office/powerpoint/2012/main" xmlns:mc="http://schemas.openxmlformats.org/markup-compatibility/2006" type="twoObjAndObj" preserve="1">
+<p:sldLayout xmlns:a="http://schemas.openxmlformats.org/drawingml/2006/main" xmlns:r="http://schemas.openxmlformats.org/officeDocument/2006/relationships" xmlns:p="http://schemas.openxmlformats.org/presentationml/2006/main" type="twoObjAndObj" preserve="1">
   <p:cSld name="Title, 2 Content and Content">
     <p:spTree>
       <p:nvGrpSpPr>
@@ -1446,14 +1732,15 @@
           </a:ln>
         </p:spPr>
         <p:txBody>
-          <a:bodyPr lIns="0" rIns="0" tIns="0" bIns="0" anchor="ctr">
+          <a:bodyPr lIns="0" tIns="0" rIns="0" bIns="0" anchor="ctr">
             <a:noAutofit/>
           </a:bodyPr>
+          <a:lstStyle/>
           <a:p>
             <a:pPr algn="ctr">
               <a:buNone/>
             </a:pPr>
-            <a:endParaRPr b="0" lang="en-US" sz="4400" spc="-1" strike="noStrike">
+            <a:endParaRPr lang="en-US" sz="4400" b="0" strike="noStrike" spc="-1">
               <a:latin typeface="Arial"/>
             </a:endParaRPr>
           </a:p>
@@ -1483,11 +1770,12 @@
           </a:ln>
         </p:spPr>
         <p:txBody>
-          <a:bodyPr lIns="0" rIns="0" tIns="0" bIns="0" anchor="t">
+          <a:bodyPr lIns="0" tIns="0" rIns="0" bIns="0" anchor="t">
             <a:normAutofit/>
           </a:bodyPr>
-          <a:p>
-            <a:endParaRPr b="0" lang="en-US" sz="3200" spc="-1" strike="noStrike">
+          <a:lstStyle/>
+          <a:p>
+            <a:endParaRPr lang="en-US" sz="3200" b="0" strike="noStrike" spc="-1">
               <a:latin typeface="Arial"/>
             </a:endParaRPr>
           </a:p>
@@ -1517,11 +1805,12 @@
           </a:ln>
         </p:spPr>
         <p:txBody>
-          <a:bodyPr lIns="0" rIns="0" tIns="0" bIns="0" anchor="t">
+          <a:bodyPr lIns="0" tIns="0" rIns="0" bIns="0" anchor="t">
             <a:normAutofit/>
           </a:bodyPr>
-          <a:p>
-            <a:endParaRPr b="0" lang="en-US" sz="3200" spc="-1" strike="noStrike">
+          <a:lstStyle/>
+          <a:p>
+            <a:endParaRPr lang="en-US" sz="3200" b="0" strike="noStrike" spc="-1">
               <a:latin typeface="Arial"/>
             </a:endParaRPr>
           </a:p>
@@ -1551,11 +1840,12 @@
           </a:ln>
         </p:spPr>
         <p:txBody>
-          <a:bodyPr lIns="0" rIns="0" tIns="0" bIns="0" anchor="t">
+          <a:bodyPr lIns="0" tIns="0" rIns="0" bIns="0" anchor="t">
             <a:normAutofit/>
           </a:bodyPr>
-          <a:p>
-            <a:endParaRPr b="0" lang="en-US" sz="3200" spc="-1" strike="noStrike">
+          <a:lstStyle/>
+          <a:p>
+            <a:endParaRPr lang="en-US" sz="3200" b="0" strike="noStrike" spc="-1">
               <a:latin typeface="Arial"/>
             </a:endParaRPr>
           </a:p>
@@ -1563,11 +1853,14 @@
       </p:sp>
     </p:spTree>
   </p:cSld>
+  <p:clrMapOvr>
+    <a:masterClrMapping/>
+  </p:clrMapOvr>
 </p:sldLayout>
 </file>
 
 <file path=ppt/slideLayouts/slideLayout8.xml><?xml version="1.0" encoding="utf-8"?>
-<p:sldLayout xmlns:a="http://schemas.openxmlformats.org/drawingml/2006/main" xmlns:p="http://schemas.openxmlformats.org/presentationml/2006/main" xmlns:r="http://schemas.openxmlformats.org/officeDocument/2006/relationships" xmlns:p14="http://schemas.microsoft.com/office/powerpoint/2010/main" xmlns:p15="http://schemas.microsoft.com/office/powerpoint/2012/main" xmlns:mc="http://schemas.openxmlformats.org/markup-compatibility/2006" type="objAndTwoObj" preserve="1">
+<p:sldLayout xmlns:a="http://schemas.openxmlformats.org/drawingml/2006/main" xmlns:r="http://schemas.openxmlformats.org/officeDocument/2006/relationships" xmlns:p="http://schemas.openxmlformats.org/presentationml/2006/main" type="objAndTwoObj" preserve="1">
   <p:cSld name="Title Content and 2 Content">
     <p:spTree>
       <p:nvGrpSpPr>
@@ -1607,14 +1900,15 @@
           </a:ln>
         </p:spPr>
         <p:txBody>
-          <a:bodyPr lIns="0" rIns="0" tIns="0" bIns="0" anchor="ctr">
+          <a:bodyPr lIns="0" tIns="0" rIns="0" bIns="0" anchor="ctr">
             <a:noAutofit/>
           </a:bodyPr>
+          <a:lstStyle/>
           <a:p>
             <a:pPr algn="ctr">
               <a:buNone/>
             </a:pPr>
-            <a:endParaRPr b="0" lang="en-US" sz="4400" spc="-1" strike="noStrike">
+            <a:endParaRPr lang="en-US" sz="4400" b="0" strike="noStrike" spc="-1">
               <a:latin typeface="Arial"/>
             </a:endParaRPr>
           </a:p>
@@ -1644,11 +1938,12 @@
           </a:ln>
         </p:spPr>
         <p:txBody>
-          <a:bodyPr lIns="0" rIns="0" tIns="0" bIns="0" anchor="t">
+          <a:bodyPr lIns="0" tIns="0" rIns="0" bIns="0" anchor="t">
             <a:normAutofit/>
           </a:bodyPr>
-          <a:p>
-            <a:endParaRPr b="0" lang="en-US" sz="3200" spc="-1" strike="noStrike">
+          <a:lstStyle/>
+          <a:p>
+            <a:endParaRPr lang="en-US" sz="3200" b="0" strike="noStrike" spc="-1">
               <a:latin typeface="Arial"/>
             </a:endParaRPr>
           </a:p>
@@ -1678,11 +1973,12 @@
           </a:ln>
         </p:spPr>
         <p:txBody>
-          <a:bodyPr lIns="0" rIns="0" tIns="0" bIns="0" anchor="t">
+          <a:bodyPr lIns="0" tIns="0" rIns="0" bIns="0" anchor="t">
             <a:normAutofit/>
           </a:bodyPr>
-          <a:p>
-            <a:endParaRPr b="0" lang="en-US" sz="3200" spc="-1" strike="noStrike">
+          <a:lstStyle/>
+          <a:p>
+            <a:endParaRPr lang="en-US" sz="3200" b="0" strike="noStrike" spc="-1">
               <a:latin typeface="Arial"/>
             </a:endParaRPr>
           </a:p>
@@ -1712,11 +2008,12 @@
           </a:ln>
         </p:spPr>
         <p:txBody>
-          <a:bodyPr lIns="0" rIns="0" tIns="0" bIns="0" anchor="t">
+          <a:bodyPr lIns="0" tIns="0" rIns="0" bIns="0" anchor="t">
             <a:normAutofit/>
           </a:bodyPr>
-          <a:p>
-            <a:endParaRPr b="0" lang="en-US" sz="3200" spc="-1" strike="noStrike">
+          <a:lstStyle/>
+          <a:p>
+            <a:endParaRPr lang="en-US" sz="3200" b="0" strike="noStrike" spc="-1">
               <a:latin typeface="Arial"/>
             </a:endParaRPr>
           </a:p>
@@ -1724,11 +2021,14 @@
       </p:sp>
     </p:spTree>
   </p:cSld>
+  <p:clrMapOvr>
+    <a:masterClrMapping/>
+  </p:clrMapOvr>
 </p:sldLayout>
 </file>
 
 <file path=ppt/slideLayouts/slideLayout9.xml><?xml version="1.0" encoding="utf-8"?>
-<p:sldLayout xmlns:a="http://schemas.openxmlformats.org/drawingml/2006/main" xmlns:p="http://schemas.openxmlformats.org/presentationml/2006/main" xmlns:r="http://schemas.openxmlformats.org/officeDocument/2006/relationships" xmlns:p14="http://schemas.microsoft.com/office/powerpoint/2010/main" xmlns:p15="http://schemas.microsoft.com/office/powerpoint/2012/main" xmlns:mc="http://schemas.openxmlformats.org/markup-compatibility/2006" type="twoObjOverTx" preserve="1">
+<p:sldLayout xmlns:a="http://schemas.openxmlformats.org/drawingml/2006/main" xmlns:r="http://schemas.openxmlformats.org/officeDocument/2006/relationships" xmlns:p="http://schemas.openxmlformats.org/presentationml/2006/main" type="twoObjOverTx" preserve="1">
   <p:cSld name="Title, 2 Content over Content">
     <p:spTree>
       <p:nvGrpSpPr>
@@ -1768,14 +2068,15 @@
           </a:ln>
         </p:spPr>
         <p:txBody>
-          <a:bodyPr lIns="0" rIns="0" tIns="0" bIns="0" anchor="ctr">
+          <a:bodyPr lIns="0" tIns="0" rIns="0" bIns="0" anchor="ctr">
             <a:noAutofit/>
           </a:bodyPr>
+          <a:lstStyle/>
           <a:p>
             <a:pPr algn="ctr">
               <a:buNone/>
             </a:pPr>
-            <a:endParaRPr b="0" lang="en-US" sz="4400" spc="-1" strike="noStrike">
+            <a:endParaRPr lang="en-US" sz="4400" b="0" strike="noStrike" spc="-1">
               <a:latin typeface="Arial"/>
             </a:endParaRPr>
           </a:p>
@@ -1805,11 +2106,12 @@
           </a:ln>
         </p:spPr>
         <p:txBody>
-          <a:bodyPr lIns="0" rIns="0" tIns="0" bIns="0" anchor="t">
+          <a:bodyPr lIns="0" tIns="0" rIns="0" bIns="0" anchor="t">
             <a:normAutofit/>
           </a:bodyPr>
-          <a:p>
-            <a:endParaRPr b="0" lang="en-US" sz="3200" spc="-1" strike="noStrike">
+          <a:lstStyle/>
+          <a:p>
+            <a:endParaRPr lang="en-US" sz="3200" b="0" strike="noStrike" spc="-1">
               <a:latin typeface="Arial"/>
             </a:endParaRPr>
           </a:p>
@@ -1839,11 +2141,12 @@
           </a:ln>
         </p:spPr>
         <p:txBody>
-          <a:bodyPr lIns="0" rIns="0" tIns="0" bIns="0" anchor="t">
+          <a:bodyPr lIns="0" tIns="0" rIns="0" bIns="0" anchor="t">
             <a:normAutofit/>
           </a:bodyPr>
-          <a:p>
-            <a:endParaRPr b="0" lang="en-US" sz="3200" spc="-1" strike="noStrike">
+          <a:lstStyle/>
+          <a:p>
+            <a:endParaRPr lang="en-US" sz="3200" b="0" strike="noStrike" spc="-1">
               <a:latin typeface="Arial"/>
             </a:endParaRPr>
           </a:p>
@@ -1873,11 +2176,12 @@
           </a:ln>
         </p:spPr>
         <p:txBody>
-          <a:bodyPr lIns="0" rIns="0" tIns="0" bIns="0" anchor="t">
+          <a:bodyPr lIns="0" tIns="0" rIns="0" bIns="0" anchor="t">
             <a:normAutofit/>
           </a:bodyPr>
-          <a:p>
-            <a:endParaRPr b="0" lang="en-US" sz="3200" spc="-1" strike="noStrike">
+          <a:lstStyle/>
+          <a:p>
+            <a:endParaRPr lang="en-US" sz="3200" b="0" strike="noStrike" spc="-1">
               <a:latin typeface="Arial"/>
             </a:endParaRPr>
           </a:p>
@@ -1885,12 +2189,20 @@
       </p:sp>
     </p:spTree>
   </p:cSld>
+  <p:clrMapOvr>
+    <a:masterClrMapping/>
+  </p:clrMapOvr>
 </p:sldLayout>
 </file>
 
 <file path=ppt/slideMasters/slideMaster1.xml><?xml version="1.0" encoding="utf-8"?>
-<p:sldMaster xmlns:a="http://schemas.openxmlformats.org/drawingml/2006/main" xmlns:p="http://schemas.openxmlformats.org/presentationml/2006/main" xmlns:r="http://schemas.openxmlformats.org/officeDocument/2006/relationships" xmlns:p14="http://schemas.microsoft.com/office/powerpoint/2010/main" xmlns:p15="http://schemas.microsoft.com/office/powerpoint/2012/main" xmlns:mc="http://schemas.openxmlformats.org/markup-compatibility/2006">
+<p:sldMaster xmlns:a="http://schemas.openxmlformats.org/drawingml/2006/main" xmlns:r="http://schemas.openxmlformats.org/officeDocument/2006/relationships" xmlns:p="http://schemas.openxmlformats.org/presentationml/2006/main">
   <p:cSld>
+    <p:bg>
+      <p:bgRef idx="1001">
+        <a:schemeClr val="bg1"/>
+      </p:bgRef>
+    </p:bg>
     <p:spTree>
       <p:nvGrpSpPr>
         <p:cNvPr id="1" name=""/>
@@ -1907,7 +2219,7 @@
       </p:grpSpPr>
       <p:sp>
         <p:nvSpPr>
-          <p:cNvPr id="0" name="PlaceHolder 1"/>
+          <p:cNvPr id="2" name="PlaceHolder 1"/>
           <p:cNvSpPr>
             <a:spLocks noGrp="1"/>
           </p:cNvSpPr>
@@ -1929,28 +2241,26 @@
           </a:ln>
         </p:spPr>
         <p:txBody>
-          <a:bodyPr lIns="0" rIns="0" tIns="0" bIns="0" anchor="ctr">
+          <a:bodyPr lIns="0" tIns="0" rIns="0" bIns="0" anchor="ctr">
             <a:noAutofit/>
           </a:bodyPr>
+          <a:lstStyle/>
           <a:p>
             <a:pPr algn="ctr">
               <a:buNone/>
             </a:pPr>
             <a:r>
-              <a:rPr b="0" lang="en-US" sz="4400" spc="-1" strike="noStrike">
+              <a:rPr lang="en-US" sz="4400" b="0" strike="noStrike" spc="-1">
                 <a:latin typeface="Arial"/>
               </a:rPr>
               <a:t>Click to edit the title text format</a:t>
             </a:r>
-            <a:endParaRPr b="0" lang="en-US" sz="4400" spc="-1" strike="noStrike">
-              <a:latin typeface="Arial"/>
-            </a:endParaRPr>
-          </a:p>
-        </p:txBody>
-      </p:sp>
-      <p:sp>
-        <p:nvSpPr>
-          <p:cNvPr id="1" name="PlaceHolder 2"/>
+          </a:p>
+        </p:txBody>
+      </p:sp>
+      <p:sp>
+        <p:nvSpPr>
+          <p:cNvPr id="3" name="PlaceHolder 2"/>
           <p:cNvSpPr>
             <a:spLocks noGrp="1"/>
           </p:cNvSpPr>
@@ -1972,9 +2282,10 @@
           </a:ln>
         </p:spPr>
         <p:txBody>
-          <a:bodyPr lIns="0" rIns="0" tIns="0" bIns="0" anchor="t">
+          <a:bodyPr lIns="0" tIns="0" rIns="0" bIns="0" anchor="t">
             <a:normAutofit/>
           </a:bodyPr>
+          <a:lstStyle/>
           <a:p>
             <a:pPr marL="432000" indent="-324000">
               <a:spcBef>
@@ -1988,17 +2299,14 @@
               <a:buChar char=""/>
             </a:pPr>
             <a:r>
-              <a:rPr b="0" lang="en-US" sz="3200" spc="-1" strike="noStrike">
+              <a:rPr lang="en-US" sz="3200" b="0" strike="noStrike" spc="-1">
                 <a:latin typeface="Arial"/>
               </a:rPr>
               <a:t>Click to edit the outline text format</a:t>
             </a:r>
-            <a:endParaRPr b="0" lang="en-US" sz="3200" spc="-1" strike="noStrike">
-              <a:latin typeface="Arial"/>
-            </a:endParaRPr>
-          </a:p>
-          <a:p>
-            <a:pPr lvl="1" marL="864000" indent="-324000">
+          </a:p>
+          <a:p>
+            <a:pPr marL="864000" lvl="1" indent="-324000">
               <a:spcBef>
                 <a:spcPts val="1134"/>
               </a:spcBef>
@@ -2010,17 +2318,14 @@
               <a:buChar char=""/>
             </a:pPr>
             <a:r>
-              <a:rPr b="0" lang="en-US" sz="2800" spc="-1" strike="noStrike">
+              <a:rPr lang="en-US" sz="2800" b="0" strike="noStrike" spc="-1">
                 <a:latin typeface="Arial"/>
               </a:rPr>
               <a:t>Second Outline Level</a:t>
             </a:r>
-            <a:endParaRPr b="0" lang="en-US" sz="2800" spc="-1" strike="noStrike">
-              <a:latin typeface="Arial"/>
-            </a:endParaRPr>
-          </a:p>
-          <a:p>
-            <a:pPr lvl="2" marL="1296000" indent="-288000">
+          </a:p>
+          <a:p>
+            <a:pPr marL="1296000" lvl="2" indent="-288000">
               <a:spcBef>
                 <a:spcPts val="850"/>
               </a:spcBef>
@@ -2032,17 +2337,14 @@
               <a:buChar char=""/>
             </a:pPr>
             <a:r>
-              <a:rPr b="0" lang="en-US" sz="2400" spc="-1" strike="noStrike">
+              <a:rPr lang="en-US" sz="2400" b="0" strike="noStrike" spc="-1">
                 <a:latin typeface="Arial"/>
               </a:rPr>
               <a:t>Third Outline Level</a:t>
             </a:r>
-            <a:endParaRPr b="0" lang="en-US" sz="2400" spc="-1" strike="noStrike">
-              <a:latin typeface="Arial"/>
-            </a:endParaRPr>
-          </a:p>
-          <a:p>
-            <a:pPr lvl="3" marL="1728000" indent="-216000">
+          </a:p>
+          <a:p>
+            <a:pPr marL="1728000" lvl="3" indent="-216000">
               <a:spcBef>
                 <a:spcPts val="567"/>
               </a:spcBef>
@@ -2054,17 +2356,14 @@
               <a:buChar char=""/>
             </a:pPr>
             <a:r>
-              <a:rPr b="0" lang="en-US" sz="2000" spc="-1" strike="noStrike">
+              <a:rPr lang="en-US" sz="2000" b="0" strike="noStrike" spc="-1">
                 <a:latin typeface="Arial"/>
               </a:rPr>
               <a:t>Fourth Outline Level</a:t>
             </a:r>
-            <a:endParaRPr b="0" lang="en-US" sz="2000" spc="-1" strike="noStrike">
-              <a:latin typeface="Arial"/>
-            </a:endParaRPr>
-          </a:p>
-          <a:p>
-            <a:pPr lvl="4" marL="2160000" indent="-216000">
+          </a:p>
+          <a:p>
+            <a:pPr marL="2160000" lvl="4" indent="-216000">
               <a:spcBef>
                 <a:spcPts val="283"/>
               </a:spcBef>
@@ -2076,17 +2375,14 @@
               <a:buChar char=""/>
             </a:pPr>
             <a:r>
-              <a:rPr b="0" lang="en-US" sz="2000" spc="-1" strike="noStrike">
+              <a:rPr lang="en-US" sz="2000" b="0" strike="noStrike" spc="-1">
                 <a:latin typeface="Arial"/>
               </a:rPr>
               <a:t>Fifth Outline Level</a:t>
             </a:r>
-            <a:endParaRPr b="0" lang="en-US" sz="2000" spc="-1" strike="noStrike">
-              <a:latin typeface="Arial"/>
-            </a:endParaRPr>
-          </a:p>
-          <a:p>
-            <a:pPr lvl="5" marL="2592000" indent="-216000">
+          </a:p>
+          <a:p>
+            <a:pPr marL="2592000" lvl="5" indent="-216000">
               <a:spcBef>
                 <a:spcPts val="283"/>
               </a:spcBef>
@@ -2098,17 +2394,14 @@
               <a:buChar char=""/>
             </a:pPr>
             <a:r>
-              <a:rPr b="0" lang="en-US" sz="2000" spc="-1" strike="noStrike">
+              <a:rPr lang="en-US" sz="2000" b="0" strike="noStrike" spc="-1">
                 <a:latin typeface="Arial"/>
               </a:rPr>
               <a:t>Sixth Outline Level</a:t>
             </a:r>
-            <a:endParaRPr b="0" lang="en-US" sz="2000" spc="-1" strike="noStrike">
-              <a:latin typeface="Arial"/>
-            </a:endParaRPr>
-          </a:p>
-          <a:p>
-            <a:pPr lvl="6" marL="3024000" indent="-216000">
+          </a:p>
+          <a:p>
+            <a:pPr marL="3024000" lvl="6" indent="-216000">
               <a:spcBef>
                 <a:spcPts val="283"/>
               </a:spcBef>
@@ -2120,45 +2413,323 @@
               <a:buChar char=""/>
             </a:pPr>
             <a:r>
-              <a:rPr b="0" lang="en-US" sz="2000" spc="-1" strike="noStrike">
+              <a:rPr lang="en-US" sz="2000" b="0" strike="noStrike" spc="-1">
                 <a:latin typeface="Arial"/>
               </a:rPr>
               <a:t>Seventh Outline Level</a:t>
             </a:r>
-            <a:endParaRPr b="0" lang="en-US" sz="2000" spc="-1" strike="noStrike">
-              <a:latin typeface="Arial"/>
-            </a:endParaRPr>
           </a:p>
         </p:txBody>
       </p:sp>
     </p:spTree>
   </p:cSld>
-  <p:clrMap bg1="lt1" bg2="lt2" tx1="dk1" tx2="dk2" accent1="accent1" accent2="accent2" accent3="accent3" accent4="accent4" accent5="accent5" accent6="accent6" hlink="hlink" folHlink="folHlink"/>
+  <p:clrMap bg1="lt1" tx1="dk1" bg2="lt2" tx2="dk2" accent1="accent1" accent2="accent2" accent3="accent3" accent4="accent4" accent5="accent5" accent6="accent6" hlink="hlink" folHlink="folHlink"/>
   <p:sldLayoutIdLst>
-    <p:sldLayoutId id="2147483649" r:id="rId2"/>
-    <p:sldLayoutId id="2147483650" r:id="rId3"/>
-    <p:sldLayoutId id="2147483651" r:id="rId4"/>
-    <p:sldLayoutId id="2147483652" r:id="rId5"/>
-    <p:sldLayoutId id="2147483653" r:id="rId6"/>
-    <p:sldLayoutId id="2147483654" r:id="rId7"/>
-    <p:sldLayoutId id="2147483655" r:id="rId8"/>
-    <p:sldLayoutId id="2147483656" r:id="rId9"/>
-    <p:sldLayoutId id="2147483657" r:id="rId10"/>
-    <p:sldLayoutId id="2147483658" r:id="rId11"/>
-    <p:sldLayoutId id="2147483659" r:id="rId12"/>
-    <p:sldLayoutId id="2147483660" r:id="rId13"/>
+    <p:sldLayoutId id="2147483649" r:id="rId1"/>
+    <p:sldLayoutId id="2147483650" r:id="rId2"/>
+    <p:sldLayoutId id="2147483651" r:id="rId3"/>
+    <p:sldLayoutId id="2147483652" r:id="rId4"/>
+    <p:sldLayoutId id="2147483653" r:id="rId5"/>
+    <p:sldLayoutId id="2147483654" r:id="rId6"/>
+    <p:sldLayoutId id="2147483655" r:id="rId7"/>
+    <p:sldLayoutId id="2147483656" r:id="rId8"/>
+    <p:sldLayoutId id="2147483657" r:id="rId9"/>
+    <p:sldLayoutId id="2147483658" r:id="rId10"/>
+    <p:sldLayoutId id="2147483659" r:id="rId11"/>
+    <p:sldLayoutId id="2147483660" r:id="rId12"/>
   </p:sldLayoutIdLst>
+  <p:txStyles>
+    <p:titleStyle>
+      <a:lvl1pPr algn="l" defTabSz="914400" rtl="0" eaLnBrk="1" latinLnBrk="0" hangingPunct="1">
+        <a:lnSpc>
+          <a:spcPct val="90000"/>
+        </a:lnSpc>
+        <a:spcBef>
+          <a:spcPct val="0"/>
+        </a:spcBef>
+        <a:buNone/>
+        <a:defRPr sz="4400" kern="1200">
+          <a:solidFill>
+            <a:schemeClr val="tx1"/>
+          </a:solidFill>
+          <a:latin typeface="+mj-lt"/>
+          <a:ea typeface="+mj-ea"/>
+          <a:cs typeface="+mj-cs"/>
+        </a:defRPr>
+      </a:lvl1pPr>
+    </p:titleStyle>
+    <p:bodyStyle>
+      <a:lvl1pPr marL="228600" indent="-228600" algn="l" defTabSz="914400" rtl="0" eaLnBrk="1" latinLnBrk="0" hangingPunct="1">
+        <a:lnSpc>
+          <a:spcPct val="90000"/>
+        </a:lnSpc>
+        <a:spcBef>
+          <a:spcPts val="1000"/>
+        </a:spcBef>
+        <a:buFont typeface="Arial" panose="020B0604020202020204" pitchFamily="34" charset="0"/>
+        <a:buChar char="•"/>
+        <a:defRPr sz="2800" kern="1200">
+          <a:solidFill>
+            <a:schemeClr val="tx1"/>
+          </a:solidFill>
+          <a:latin typeface="+mn-lt"/>
+          <a:ea typeface="+mn-ea"/>
+          <a:cs typeface="+mn-cs"/>
+        </a:defRPr>
+      </a:lvl1pPr>
+      <a:lvl2pPr marL="685800" indent="-228600" algn="l" defTabSz="914400" rtl="0" eaLnBrk="1" latinLnBrk="0" hangingPunct="1">
+        <a:lnSpc>
+          <a:spcPct val="90000"/>
+        </a:lnSpc>
+        <a:spcBef>
+          <a:spcPts val="500"/>
+        </a:spcBef>
+        <a:buFont typeface="Arial" panose="020B0604020202020204" pitchFamily="34" charset="0"/>
+        <a:buChar char="•"/>
+        <a:defRPr sz="2400" kern="1200">
+          <a:solidFill>
+            <a:schemeClr val="tx1"/>
+          </a:solidFill>
+          <a:latin typeface="+mn-lt"/>
+          <a:ea typeface="+mn-ea"/>
+          <a:cs typeface="+mn-cs"/>
+        </a:defRPr>
+      </a:lvl2pPr>
+      <a:lvl3pPr marL="1143000" indent="-228600" algn="l" defTabSz="914400" rtl="0" eaLnBrk="1" latinLnBrk="0" hangingPunct="1">
+        <a:lnSpc>
+          <a:spcPct val="90000"/>
+        </a:lnSpc>
+        <a:spcBef>
+          <a:spcPts val="500"/>
+        </a:spcBef>
+        <a:buFont typeface="Arial" panose="020B0604020202020204" pitchFamily="34" charset="0"/>
+        <a:buChar char="•"/>
+        <a:defRPr sz="2000" kern="1200">
+          <a:solidFill>
+            <a:schemeClr val="tx1"/>
+          </a:solidFill>
+          <a:latin typeface="+mn-lt"/>
+          <a:ea typeface="+mn-ea"/>
+          <a:cs typeface="+mn-cs"/>
+        </a:defRPr>
+      </a:lvl3pPr>
+      <a:lvl4pPr marL="1600200" indent="-228600" algn="l" defTabSz="914400" rtl="0" eaLnBrk="1" latinLnBrk="0" hangingPunct="1">
+        <a:lnSpc>
+          <a:spcPct val="90000"/>
+        </a:lnSpc>
+        <a:spcBef>
+          <a:spcPts val="500"/>
+        </a:spcBef>
+        <a:buFont typeface="Arial" panose="020B0604020202020204" pitchFamily="34" charset="0"/>
+        <a:buChar char="•"/>
+        <a:defRPr sz="1800" kern="1200">
+          <a:solidFill>
+            <a:schemeClr val="tx1"/>
+          </a:solidFill>
+          <a:latin typeface="+mn-lt"/>
+          <a:ea typeface="+mn-ea"/>
+          <a:cs typeface="+mn-cs"/>
+        </a:defRPr>
+      </a:lvl4pPr>
+      <a:lvl5pPr marL="2057400" indent="-228600" algn="l" defTabSz="914400" rtl="0" eaLnBrk="1" latinLnBrk="0" hangingPunct="1">
+        <a:lnSpc>
+          <a:spcPct val="90000"/>
+        </a:lnSpc>
+        <a:spcBef>
+          <a:spcPts val="500"/>
+        </a:spcBef>
+        <a:buFont typeface="Arial" panose="020B0604020202020204" pitchFamily="34" charset="0"/>
+        <a:buChar char="•"/>
+        <a:defRPr sz="1800" kern="1200">
+          <a:solidFill>
+            <a:schemeClr val="tx1"/>
+          </a:solidFill>
+          <a:latin typeface="+mn-lt"/>
+          <a:ea typeface="+mn-ea"/>
+          <a:cs typeface="+mn-cs"/>
+        </a:defRPr>
+      </a:lvl5pPr>
+      <a:lvl6pPr marL="2514600" indent="-228600" algn="l" defTabSz="914400" rtl="0" eaLnBrk="1" latinLnBrk="0" hangingPunct="1">
+        <a:lnSpc>
+          <a:spcPct val="90000"/>
+        </a:lnSpc>
+        <a:spcBef>
+          <a:spcPts val="500"/>
+        </a:spcBef>
+        <a:buFont typeface="Arial" panose="020B0604020202020204" pitchFamily="34" charset="0"/>
+        <a:buChar char="•"/>
+        <a:defRPr sz="1800" kern="1200">
+          <a:solidFill>
+            <a:schemeClr val="tx1"/>
+          </a:solidFill>
+          <a:latin typeface="+mn-lt"/>
+          <a:ea typeface="+mn-ea"/>
+          <a:cs typeface="+mn-cs"/>
+        </a:defRPr>
+      </a:lvl6pPr>
+      <a:lvl7pPr marL="2971800" indent="-228600" algn="l" defTabSz="914400" rtl="0" eaLnBrk="1" latinLnBrk="0" hangingPunct="1">
+        <a:lnSpc>
+          <a:spcPct val="90000"/>
+        </a:lnSpc>
+        <a:spcBef>
+          <a:spcPts val="500"/>
+        </a:spcBef>
+        <a:buFont typeface="Arial" panose="020B0604020202020204" pitchFamily="34" charset="0"/>
+        <a:buChar char="•"/>
+        <a:defRPr sz="1800" kern="1200">
+          <a:solidFill>
+            <a:schemeClr val="tx1"/>
+          </a:solidFill>
+          <a:latin typeface="+mn-lt"/>
+          <a:ea typeface="+mn-ea"/>
+          <a:cs typeface="+mn-cs"/>
+        </a:defRPr>
+      </a:lvl7pPr>
+      <a:lvl8pPr marL="3429000" indent="-228600" algn="l" defTabSz="914400" rtl="0" eaLnBrk="1" latinLnBrk="0" hangingPunct="1">
+        <a:lnSpc>
+          <a:spcPct val="90000"/>
+        </a:lnSpc>
+        <a:spcBef>
+          <a:spcPts val="500"/>
+        </a:spcBef>
+        <a:buFont typeface="Arial" panose="020B0604020202020204" pitchFamily="34" charset="0"/>
+        <a:buChar char="•"/>
+        <a:defRPr sz="1800" kern="1200">
+          <a:solidFill>
+            <a:schemeClr val="tx1"/>
+          </a:solidFill>
+          <a:latin typeface="+mn-lt"/>
+          <a:ea typeface="+mn-ea"/>
+          <a:cs typeface="+mn-cs"/>
+        </a:defRPr>
+      </a:lvl8pPr>
+      <a:lvl9pPr marL="3886200" indent="-228600" algn="l" defTabSz="914400" rtl="0" eaLnBrk="1" latinLnBrk="0" hangingPunct="1">
+        <a:lnSpc>
+          <a:spcPct val="90000"/>
+        </a:lnSpc>
+        <a:spcBef>
+          <a:spcPts val="500"/>
+        </a:spcBef>
+        <a:buFont typeface="Arial" panose="020B0604020202020204" pitchFamily="34" charset="0"/>
+        <a:buChar char="•"/>
+        <a:defRPr sz="1800" kern="1200">
+          <a:solidFill>
+            <a:schemeClr val="tx1"/>
+          </a:solidFill>
+          <a:latin typeface="+mn-lt"/>
+          <a:ea typeface="+mn-ea"/>
+          <a:cs typeface="+mn-cs"/>
+        </a:defRPr>
+      </a:lvl9pPr>
+    </p:bodyStyle>
+    <p:otherStyle>
+      <a:defPPr>
+        <a:defRPr lang="en-US"/>
+      </a:defPPr>
+      <a:lvl1pPr marL="0" algn="l" defTabSz="914400" rtl="0" eaLnBrk="1" latinLnBrk="0" hangingPunct="1">
+        <a:defRPr sz="1800" kern="1200">
+          <a:solidFill>
+            <a:schemeClr val="tx1"/>
+          </a:solidFill>
+          <a:latin typeface="+mn-lt"/>
+          <a:ea typeface="+mn-ea"/>
+          <a:cs typeface="+mn-cs"/>
+        </a:defRPr>
+      </a:lvl1pPr>
+      <a:lvl2pPr marL="457200" algn="l" defTabSz="914400" rtl="0" eaLnBrk="1" latinLnBrk="0" hangingPunct="1">
+        <a:defRPr sz="1800" kern="1200">
+          <a:solidFill>
+            <a:schemeClr val="tx1"/>
+          </a:solidFill>
+          <a:latin typeface="+mn-lt"/>
+          <a:ea typeface="+mn-ea"/>
+          <a:cs typeface="+mn-cs"/>
+        </a:defRPr>
+      </a:lvl2pPr>
+      <a:lvl3pPr marL="914400" algn="l" defTabSz="914400" rtl="0" eaLnBrk="1" latinLnBrk="0" hangingPunct="1">
+        <a:defRPr sz="1800" kern="1200">
+          <a:solidFill>
+            <a:schemeClr val="tx1"/>
+          </a:solidFill>
+          <a:latin typeface="+mn-lt"/>
+          <a:ea typeface="+mn-ea"/>
+          <a:cs typeface="+mn-cs"/>
+        </a:defRPr>
+      </a:lvl3pPr>
+      <a:lvl4pPr marL="1371600" algn="l" defTabSz="914400" rtl="0" eaLnBrk="1" latinLnBrk="0" hangingPunct="1">
+        <a:defRPr sz="1800" kern="1200">
+          <a:solidFill>
+            <a:schemeClr val="tx1"/>
+          </a:solidFill>
+          <a:latin typeface="+mn-lt"/>
+          <a:ea typeface="+mn-ea"/>
+          <a:cs typeface="+mn-cs"/>
+        </a:defRPr>
+      </a:lvl4pPr>
+      <a:lvl5pPr marL="1828800" algn="l" defTabSz="914400" rtl="0" eaLnBrk="1" latinLnBrk="0" hangingPunct="1">
+        <a:defRPr sz="1800" kern="1200">
+          <a:solidFill>
+            <a:schemeClr val="tx1"/>
+          </a:solidFill>
+          <a:latin typeface="+mn-lt"/>
+          <a:ea typeface="+mn-ea"/>
+          <a:cs typeface="+mn-cs"/>
+        </a:defRPr>
+      </a:lvl5pPr>
+      <a:lvl6pPr marL="2286000" algn="l" defTabSz="914400" rtl="0" eaLnBrk="1" latinLnBrk="0" hangingPunct="1">
+        <a:defRPr sz="1800" kern="1200">
+          <a:solidFill>
+            <a:schemeClr val="tx1"/>
+          </a:solidFill>
+          <a:latin typeface="+mn-lt"/>
+          <a:ea typeface="+mn-ea"/>
+          <a:cs typeface="+mn-cs"/>
+        </a:defRPr>
+      </a:lvl6pPr>
+      <a:lvl7pPr marL="2743200" algn="l" defTabSz="914400" rtl="0" eaLnBrk="1" latinLnBrk="0" hangingPunct="1">
+        <a:defRPr sz="1800" kern="1200">
+          <a:solidFill>
+            <a:schemeClr val="tx1"/>
+          </a:solidFill>
+          <a:latin typeface="+mn-lt"/>
+          <a:ea typeface="+mn-ea"/>
+          <a:cs typeface="+mn-cs"/>
+        </a:defRPr>
+      </a:lvl7pPr>
+      <a:lvl8pPr marL="3200400" algn="l" defTabSz="914400" rtl="0" eaLnBrk="1" latinLnBrk="0" hangingPunct="1">
+        <a:defRPr sz="1800" kern="1200">
+          <a:solidFill>
+            <a:schemeClr val="tx1"/>
+          </a:solidFill>
+          <a:latin typeface="+mn-lt"/>
+          <a:ea typeface="+mn-ea"/>
+          <a:cs typeface="+mn-cs"/>
+        </a:defRPr>
+      </a:lvl8pPr>
+      <a:lvl9pPr marL="3657600" algn="l" defTabSz="914400" rtl="0" eaLnBrk="1" latinLnBrk="0" hangingPunct="1">
+        <a:defRPr sz="1800" kern="1200">
+          <a:solidFill>
+            <a:schemeClr val="tx1"/>
+          </a:solidFill>
+          <a:latin typeface="+mn-lt"/>
+          <a:ea typeface="+mn-ea"/>
+          <a:cs typeface="+mn-cs"/>
+        </a:defRPr>
+      </a:lvl9pPr>
+    </p:otherStyle>
+  </p:txStyles>
 </p:sldMaster>
 </file>
 
 <file path=ppt/slides/slide1.xml><?xml version="1.0" encoding="utf-8"?>
-<p:sld xmlns:a="http://schemas.openxmlformats.org/drawingml/2006/main" xmlns:p="http://schemas.openxmlformats.org/presentationml/2006/main" xmlns:r="http://schemas.openxmlformats.org/officeDocument/2006/relationships" xmlns:p14="http://schemas.microsoft.com/office/powerpoint/2010/main" xmlns:p15="http://schemas.microsoft.com/office/powerpoint/2012/main" xmlns:mc="http://schemas.openxmlformats.org/markup-compatibility/2006">
+<p:sld xmlns:a="http://schemas.openxmlformats.org/drawingml/2006/main" xmlns:r="http://schemas.openxmlformats.org/officeDocument/2006/relationships" xmlns:p="http://schemas.openxmlformats.org/presentationml/2006/main">
   <p:cSld>
     <p:bg>
       <p:bgPr>
         <a:solidFill>
-          <a:srgbClr val="ffffff"/>
+          <a:srgbClr val="FFFFFF"/>
         </a:solidFill>
+        <a:effectLst/>
       </p:bgPr>
     </p:bg>
     <p:spTree>
@@ -2183,8 +2754,8 @@
         </p:nvSpPr>
         <p:spPr>
           <a:xfrm>
-            <a:off x="504000" y="363600"/>
-            <a:ext cx="9068400" cy="669600"/>
+            <a:off x="504000" y="359846"/>
+            <a:ext cx="9068400" cy="677108"/>
           </a:xfrm>
           <a:prstGeom prst="rect">
             <a:avLst/>
@@ -2195,15 +2766,22 @@
           </a:ln>
         </p:spPr>
         <p:style>
-          <a:lnRef idx="0"/>
-          <a:fillRef idx="0"/>
-          <a:effectRef idx="0"/>
+          <a:lnRef idx="0">
+            <a:scrgbClr r="0" g="0" b="0"/>
+          </a:lnRef>
+          <a:fillRef idx="0">
+            <a:scrgbClr r="0" g="0" b="0"/>
+          </a:fillRef>
+          <a:effectRef idx="0">
+            <a:scrgbClr r="0" g="0" b="0"/>
+          </a:effectRef>
           <a:fontRef idx="minor"/>
         </p:style>
         <p:txBody>
-          <a:bodyPr lIns="0" rIns="0" tIns="0" bIns="0" anchor="ctr">
+          <a:bodyPr wrap="square" lIns="0" tIns="0" rIns="0" bIns="0" anchor="ctr">
             <a:spAutoFit/>
           </a:bodyPr>
+          <a:lstStyle/>
           <a:p>
             <a:pPr algn="ctr">
               <a:lnSpc>
@@ -2212,7 +2790,7 @@
               <a:buNone/>
             </a:pPr>
             <a:r>
-              <a:rPr b="0" lang="en-US" sz="4400" spc="-1" strike="noStrike">
+              <a:rPr lang="en-US" sz="4400" b="0" strike="noStrike" spc="-1">
                 <a:solidFill>
                   <a:srgbClr val="000000"/>
                 </a:solidFill>
@@ -2221,7 +2799,7 @@
               </a:rPr>
               <a:t>{{title}}</a:t>
             </a:r>
-            <a:endParaRPr b="0" lang="en-US" sz="4400" spc="-1" strike="noStrike">
+            <a:endParaRPr lang="en-US" sz="4400" b="0" strike="noStrike" spc="-1">
               <a:latin typeface="Arial"/>
             </a:endParaRPr>
           </a:p>
@@ -2247,15 +2825,21 @@
           </a:ln>
         </p:spPr>
         <p:style>
-          <a:lnRef idx="0"/>
-          <a:fillRef idx="0"/>
-          <a:effectRef idx="0"/>
+          <a:lnRef idx="0">
+            <a:scrgbClr r="0" g="0" b="0"/>
+          </a:lnRef>
+          <a:fillRef idx="0">
+            <a:scrgbClr r="0" g="0" b="0"/>
+          </a:fillRef>
+          <a:effectRef idx="0">
+            <a:scrgbClr r="0" g="0" b="0"/>
+          </a:effectRef>
           <a:fontRef idx="minor"/>
         </p:style>
       </p:sp>
       <p:graphicFrame>
         <p:nvGraphicFramePr>
-          <p:cNvPr id="40" name=""/>
+          <p:cNvPr id="40" name="Chart 39"/>
           <p:cNvGraphicFramePr/>
           <p:nvPr/>
         </p:nvGraphicFramePr>
@@ -2265,7 +2849,7 @@
         </p:xfrm>
         <a:graphic>
           <a:graphicData uri="http://schemas.openxmlformats.org/drawingml/2006/chart">
-            <c:chart xmlns:c="http://schemas.openxmlformats.org/drawingml/2006/chart" xmlns:r="http://schemas.openxmlformats.org/officeDocument/2006/relationships" r:id="rId1"/>
+            <c:chart xmlns:c="http://schemas.openxmlformats.org/drawingml/2006/chart" xmlns:r="http://schemas.openxmlformats.org/officeDocument/2006/relationships" r:id="rId2"/>
           </a:graphicData>
         </a:graphic>
       </p:graphicFrame>
@@ -2277,8 +2861,8 @@
         </p:nvSpPr>
         <p:spPr>
           <a:xfrm>
-            <a:off x="3931920" y="1041120"/>
-            <a:ext cx="1765080" cy="363960"/>
+            <a:off x="505369" y="1031548"/>
+            <a:ext cx="9065171" cy="367878"/>
           </a:xfrm>
           <a:prstGeom prst="rect">
             <a:avLst/>
@@ -2289,67 +2873,22 @@
           </a:ln>
         </p:spPr>
         <p:style>
-          <a:lnRef idx="0"/>
-          <a:fillRef idx="0"/>
-          <a:effectRef idx="0"/>
+          <a:lnRef idx="0">
+            <a:scrgbClr r="0" g="0" b="0"/>
+          </a:lnRef>
+          <a:fillRef idx="0">
+            <a:scrgbClr r="0" g="0" b="0"/>
+          </a:fillRef>
+          <a:effectRef idx="0">
+            <a:scrgbClr r="0" g="0" b="0"/>
+          </a:effectRef>
           <a:fontRef idx="minor"/>
         </p:style>
         <p:txBody>
-          <a:bodyPr lIns="90000" rIns="90000" tIns="45000" bIns="45000" anchor="t">
+          <a:bodyPr wrap="square" lIns="90000" tIns="45000" rIns="90000" bIns="45000" anchor="t">
             <a:spAutoFit/>
           </a:bodyPr>
-          <a:p>
-            <a:pPr>
-              <a:lnSpc>
-                <a:spcPct val="100000"/>
-              </a:lnSpc>
-              <a:buNone/>
-            </a:pPr>
-            <a:r>
-              <a:rPr b="0" lang="en-US" sz="1800" spc="-1" strike="noStrike">
-                <a:solidFill>
-                  <a:srgbClr val="000000"/>
-                </a:solidFill>
-                <a:latin typeface="Arial"/>
-                <a:ea typeface="DejaVu Sans"/>
-              </a:rPr>
-              <a:t>(% of suppliers)</a:t>
-            </a:r>
-            <a:endParaRPr b="0" lang="en-US" sz="1800" spc="-1" strike="noStrike">
-              <a:latin typeface="Arial"/>
-            </a:endParaRPr>
-          </a:p>
-        </p:txBody>
-      </p:sp>
-      <p:sp>
-        <p:nvSpPr>
-          <p:cNvPr id="42" name="CustomShape 4"/>
-          <p:cNvSpPr/>
-          <p:nvPr/>
-        </p:nvSpPr>
-        <p:spPr>
-          <a:xfrm>
-            <a:off x="1645920" y="1406880"/>
-            <a:ext cx="6674400" cy="363960"/>
-          </a:xfrm>
-          <a:prstGeom prst="rect">
-            <a:avLst/>
-          </a:prstGeom>
-          <a:noFill/>
-          <a:ln w="0">
-            <a:noFill/>
-          </a:ln>
-        </p:spPr>
-        <p:style>
-          <a:lnRef idx="0"/>
-          <a:fillRef idx="0"/>
-          <a:effectRef idx="0"/>
-          <a:fontRef idx="minor"/>
-        </p:style>
-        <p:txBody>
-          <a:bodyPr lIns="90000" rIns="90000" tIns="45000" bIns="45000" anchor="t">
-            <a:spAutoFit/>
-          </a:bodyPr>
+          <a:lstStyle/>
           <a:p>
             <a:pPr algn="ctr">
               <a:lnSpc>
@@ -2358,7 +2897,76 @@
               <a:buNone/>
             </a:pPr>
             <a:r>
-              <a:rPr b="0" lang="en-US" sz="1800" spc="-1" strike="noStrike">
+              <a:rPr lang="en-US" spc="-1" dirty="0">
+                <a:solidFill>
+                  <a:srgbClr val="000000"/>
+                </a:solidFill>
+                <a:latin typeface="Arial"/>
+                <a:ea typeface="DejaVu Sans"/>
+              </a:rPr>
+              <a:t>({{unit}}</a:t>
+            </a:r>
+            <a:r>
+              <a:rPr lang="en-US" sz="1800" b="0" strike="noStrike" spc="-1" dirty="0">
+                <a:solidFill>
+                  <a:srgbClr val="000000"/>
+                </a:solidFill>
+                <a:latin typeface="Arial"/>
+                <a:ea typeface="DejaVu Sans"/>
+              </a:rPr>
+              <a:t> of suppliers)</a:t>
+            </a:r>
+            <a:endParaRPr lang="en-US" sz="1800" b="0" strike="noStrike" spc="-1" dirty="0">
+              <a:latin typeface="Arial"/>
+            </a:endParaRPr>
+          </a:p>
+        </p:txBody>
+      </p:sp>
+      <p:sp>
+        <p:nvSpPr>
+          <p:cNvPr id="42" name="CustomShape 4"/>
+          <p:cNvSpPr/>
+          <p:nvPr/>
+        </p:nvSpPr>
+        <p:spPr>
+          <a:xfrm>
+            <a:off x="510100" y="1397338"/>
+            <a:ext cx="9063173" cy="367878"/>
+          </a:xfrm>
+          <a:prstGeom prst="rect">
+            <a:avLst/>
+          </a:prstGeom>
+          <a:noFill/>
+          <a:ln w="0">
+            <a:noFill/>
+          </a:ln>
+        </p:spPr>
+        <p:style>
+          <a:lnRef idx="0">
+            <a:scrgbClr r="0" g="0" b="0"/>
+          </a:lnRef>
+          <a:fillRef idx="0">
+            <a:scrgbClr r="0" g="0" b="0"/>
+          </a:fillRef>
+          <a:effectRef idx="0">
+            <a:scrgbClr r="0" g="0" b="0"/>
+          </a:effectRef>
+          <a:fontRef idx="minor"/>
+        </p:style>
+        <p:txBody>
+          <a:bodyPr wrap="square" lIns="90000" tIns="45000" rIns="90000" bIns="45000" anchor="t">
+            <a:spAutoFit/>
+          </a:bodyPr>
+          <a:lstStyle/>
+          <a:p>
+            <a:pPr algn="ctr">
+              <a:lnSpc>
+                <a:spcPct val="100000"/>
+              </a:lnSpc>
+              <a:buNone/>
+            </a:pPr>
+            <a:r>
+              <a:rPr lang="en-US" sz="1800" b="0" strike="noStrike" spc="-1">
                 <a:solidFill>
                   <a:srgbClr val="000000"/>
                 </a:solidFill>
@@ -2367,7 +2975,7 @@
               </a:rPr>
               <a:t>outer to inner: {{accounts}}</a:t>
             </a:r>
-            <a:endParaRPr b="0" lang="en-US" sz="1800" spc="-1" strike="noStrike">
+            <a:endParaRPr lang="en-US" sz="1800" b="0" strike="noStrike" spc="-1">
               <a:latin typeface="Arial"/>
             </a:endParaRPr>
           </a:p>
@@ -2375,14 +2983,9 @@
       </p:sp>
     </p:spTree>
   </p:cSld>
-  <mc:AlternateContent>
-    <mc:Choice Requires="p14">
-      <p:transition spd="slow" p14:dur="2000"/>
-    </mc:Choice>
-    <mc:Fallback>
-      <p:transition spd="slow"/>
-    </mc:Fallback>
-  </mc:AlternateContent>
+  <p:clrMapOvr>
+    <a:masterClrMapping/>
+  </p:clrMapOvr>
 </p:sld>
 </file>
 
@@ -2397,31 +3000,31 @@
         <a:sysClr val="window" lastClr="FFFFFF"/>
       </a:lt1>
       <a:dk2>
-        <a:srgbClr val="1f497d"/>
+        <a:srgbClr val="1F497D"/>
       </a:dk2>
       <a:lt2>
-        <a:srgbClr val="eeece1"/>
+        <a:srgbClr val="EEECE1"/>
       </a:lt2>
       <a:accent1>
-        <a:srgbClr val="4f81bd"/>
+        <a:srgbClr val="4F81BD"/>
       </a:accent1>
       <a:accent2>
-        <a:srgbClr val="c0504d"/>
+        <a:srgbClr val="C0504D"/>
       </a:accent2>
       <a:accent3>
-        <a:srgbClr val="9bbb59"/>
+        <a:srgbClr val="9BBB59"/>
       </a:accent3>
       <a:accent4>
-        <a:srgbClr val="8064a2"/>
+        <a:srgbClr val="8064A2"/>
       </a:accent4>
       <a:accent5>
-        <a:srgbClr val="4bacc6"/>
+        <a:srgbClr val="4BACC6"/>
       </a:accent5>
       <a:accent6>
-        <a:srgbClr val="f79646"/>
+        <a:srgbClr val="F79646"/>
       </a:accent6>
       <a:hlink>
-        <a:srgbClr val="0000ff"/>
+        <a:srgbClr val="0000FF"/>
       </a:hlink>
       <a:folHlink>
         <a:srgbClr val="800080"/>
@@ -2609,5 +3212,7 @@
       </a:bgFillStyleLst>
     </a:fmtScheme>
   </a:themeElements>
+  <a:objectDefaults/>
+  <a:extraClrSchemeLst/>
 </a:theme>
 </file>
</xml_diff>